<commit_message>
Added discriminator part to ppoint
</commit_message>
<xml_diff>
--- a/CycleGAN_simple/report_resources/COMP473_Project.pptx
+++ b/CycleGAN_simple/report_resources/COMP473_Project.pptx
@@ -7,12 +7,15 @@
   <p:sldIdLst>
     <p:sldId id="256" r:id="rId2"/>
     <p:sldId id="257" r:id="rId3"/>
-    <p:sldId id="258" r:id="rId4"/>
-    <p:sldId id="259" r:id="rId5"/>
-    <p:sldId id="262" r:id="rId6"/>
-    <p:sldId id="260" r:id="rId7"/>
-    <p:sldId id="261" r:id="rId8"/>
-    <p:sldId id="263" r:id="rId9"/>
+    <p:sldId id="264" r:id="rId4"/>
+    <p:sldId id="265" r:id="rId5"/>
+    <p:sldId id="266" r:id="rId6"/>
+    <p:sldId id="258" r:id="rId7"/>
+    <p:sldId id="259" r:id="rId8"/>
+    <p:sldId id="262" r:id="rId9"/>
+    <p:sldId id="260" r:id="rId10"/>
+    <p:sldId id="261" r:id="rId11"/>
+    <p:sldId id="263" r:id="rId12"/>
   </p:sldIdLst>
   <p:sldSz cx="12192000" cy="6858000"/>
   <p:notesSz cx="6858000" cy="9144000"/>
@@ -111,6 +114,11 @@
       </a:defRPr>
     </a:lvl9pPr>
   </p:defaultTextStyle>
+  <p:extLst>
+    <p:ext uri="{EFAFB233-063F-42B5-8137-9DF3F51BA10A}">
+      <p15:sldGuideLst xmlns:p15="http://schemas.microsoft.com/office/powerpoint/2012/main"/>
+    </p:ext>
+  </p:extLst>
 </p:presentation>
 </file>
 
@@ -344,7 +352,7 @@
             <a:fld id="{B61BEF0D-F0BB-DE4B-95CE-6DB70DBA9567}" type="datetimeFigureOut">
               <a:rPr lang="en-US" dirty="0"/>
               <a:pPr/>
-              <a:t>12/1/2020</a:t>
+              <a:t>12/2/2020</a:t>
             </a:fld>
             <a:endParaRPr lang="en-US" dirty="0"/>
           </a:p>
@@ -675,7 +683,7 @@
             <a:fld id="{B61BEF0D-F0BB-DE4B-95CE-6DB70DBA9567}" type="datetimeFigureOut">
               <a:rPr lang="en-US" dirty="0"/>
               <a:pPr/>
-              <a:t>12/1/2020</a:t>
+              <a:t>12/2/2020</a:t>
             </a:fld>
             <a:endParaRPr lang="en-US" dirty="0"/>
           </a:p>
@@ -950,7 +958,7 @@
             <a:fld id="{B61BEF0D-F0BB-DE4B-95CE-6DB70DBA9567}" type="datetimeFigureOut">
               <a:rPr lang="en-US" dirty="0"/>
               <a:pPr/>
-              <a:t>12/1/2020</a:t>
+              <a:t>12/2/2020</a:t>
             </a:fld>
             <a:endParaRPr lang="en-US" dirty="0"/>
           </a:p>
@@ -1515,7 +1523,7 @@
             <a:fld id="{B61BEF0D-F0BB-DE4B-95CE-6DB70DBA9567}" type="datetimeFigureOut">
               <a:rPr lang="en-US" dirty="0"/>
               <a:pPr/>
-              <a:t>12/1/2020</a:t>
+              <a:t>12/2/2020</a:t>
             </a:fld>
             <a:endParaRPr lang="en-US" dirty="0"/>
           </a:p>
@@ -1790,7 +1798,7 @@
             <a:fld id="{B61BEF0D-F0BB-DE4B-95CE-6DB70DBA9567}" type="datetimeFigureOut">
               <a:rPr lang="en-US" dirty="0"/>
               <a:pPr/>
-              <a:t>12/1/2020</a:t>
+              <a:t>12/2/2020</a:t>
             </a:fld>
             <a:endParaRPr lang="en-US" dirty="0"/>
           </a:p>
@@ -2349,7 +2357,7 @@
             <a:fld id="{B61BEF0D-F0BB-DE4B-95CE-6DB70DBA9567}" type="datetimeFigureOut">
               <a:rPr lang="en-US" dirty="0"/>
               <a:pPr/>
-              <a:t>12/1/2020</a:t>
+              <a:t>12/2/2020</a:t>
             </a:fld>
             <a:endParaRPr lang="en-US" dirty="0"/>
           </a:p>
@@ -2673,7 +2681,7 @@
             <a:fld id="{B61BEF0D-F0BB-DE4B-95CE-6DB70DBA9567}" type="datetimeFigureOut">
               <a:rPr lang="en-US" dirty="0"/>
               <a:pPr/>
-              <a:t>12/1/2020</a:t>
+              <a:t>12/2/2020</a:t>
             </a:fld>
             <a:endParaRPr lang="en-US" dirty="0"/>
           </a:p>
@@ -2847,7 +2855,7 @@
             <a:fld id="{B61BEF0D-F0BB-DE4B-95CE-6DB70DBA9567}" type="datetimeFigureOut">
               <a:rPr lang="en-US" dirty="0"/>
               <a:pPr/>
-              <a:t>12/1/2020</a:t>
+              <a:t>12/2/2020</a:t>
             </a:fld>
             <a:endParaRPr lang="en-US" dirty="0"/>
           </a:p>
@@ -3082,7 +3090,7 @@
             <a:fld id="{B61BEF0D-F0BB-DE4B-95CE-6DB70DBA9567}" type="datetimeFigureOut">
               <a:rPr lang="en-US" dirty="0"/>
               <a:pPr/>
-              <a:t>12/1/2020</a:t>
+              <a:t>12/2/2020</a:t>
             </a:fld>
             <a:endParaRPr lang="en-US" dirty="0"/>
           </a:p>
@@ -3279,7 +3287,7 @@
             <a:fld id="{B61BEF0D-F0BB-DE4B-95CE-6DB70DBA9567}" type="datetimeFigureOut">
               <a:rPr lang="en-US" dirty="0"/>
               <a:pPr/>
-              <a:t>12/1/2020</a:t>
+              <a:t>12/2/2020</a:t>
             </a:fld>
             <a:endParaRPr lang="en-US" dirty="0"/>
           </a:p>
@@ -3552,7 +3560,7 @@
             <a:fld id="{B61BEF0D-F0BB-DE4B-95CE-6DB70DBA9567}" type="datetimeFigureOut">
               <a:rPr lang="en-US" dirty="0"/>
               <a:pPr/>
-              <a:t>12/1/2020</a:t>
+              <a:t>12/2/2020</a:t>
             </a:fld>
             <a:endParaRPr lang="en-US" dirty="0"/>
           </a:p>
@@ -3815,7 +3823,7 @@
             <a:fld id="{B61BEF0D-F0BB-DE4B-95CE-6DB70DBA9567}" type="datetimeFigureOut">
               <a:rPr lang="en-US" dirty="0"/>
               <a:pPr/>
-              <a:t>12/1/2020</a:t>
+              <a:t>12/2/2020</a:t>
             </a:fld>
             <a:endParaRPr lang="en-US" dirty="0"/>
           </a:p>
@@ -4186,7 +4194,7 @@
             <a:fld id="{B61BEF0D-F0BB-DE4B-95CE-6DB70DBA9567}" type="datetimeFigureOut">
               <a:rPr lang="en-US" dirty="0"/>
               <a:pPr/>
-              <a:t>12/1/2020</a:t>
+              <a:t>12/2/2020</a:t>
             </a:fld>
             <a:endParaRPr lang="en-US" dirty="0"/>
           </a:p>
@@ -4331,7 +4339,7 @@
             <a:fld id="{B61BEF0D-F0BB-DE4B-95CE-6DB70DBA9567}" type="datetimeFigureOut">
               <a:rPr lang="en-US" dirty="0"/>
               <a:pPr/>
-              <a:t>12/1/2020</a:t>
+              <a:t>12/2/2020</a:t>
             </a:fld>
             <a:endParaRPr lang="en-US" dirty="0"/>
           </a:p>
@@ -4453,7 +4461,7 @@
             <a:fld id="{B61BEF0D-F0BB-DE4B-95CE-6DB70DBA9567}" type="datetimeFigureOut">
               <a:rPr lang="en-US" dirty="0"/>
               <a:pPr/>
-              <a:t>12/1/2020</a:t>
+              <a:t>12/2/2020</a:t>
             </a:fld>
             <a:endParaRPr lang="en-US" dirty="0"/>
           </a:p>
@@ -4735,7 +4743,7 @@
             <a:fld id="{B61BEF0D-F0BB-DE4B-95CE-6DB70DBA9567}" type="datetimeFigureOut">
               <a:rPr lang="en-US" dirty="0"/>
               <a:pPr/>
-              <a:t>12/1/2020</a:t>
+              <a:t>12/2/2020</a:t>
             </a:fld>
             <a:endParaRPr lang="en-US" dirty="0"/>
           </a:p>
@@ -5056,7 +5064,7 @@
             <a:fld id="{B61BEF0D-F0BB-DE4B-95CE-6DB70DBA9567}" type="datetimeFigureOut">
               <a:rPr lang="en-US" dirty="0"/>
               <a:pPr/>
-              <a:t>12/1/2020</a:t>
+              <a:t>12/2/2020</a:t>
             </a:fld>
             <a:endParaRPr lang="en-US" dirty="0"/>
           </a:p>
@@ -5267,7 +5275,7 @@
             <a:fld id="{B61BEF0D-F0BB-DE4B-95CE-6DB70DBA9567}" type="datetimeFigureOut">
               <a:rPr lang="en-US" dirty="0"/>
               <a:pPr/>
-              <a:t>12/1/2020</a:t>
+              <a:t>12/2/2020</a:t>
             </a:fld>
             <a:endParaRPr lang="en-US" dirty="0"/>
           </a:p>
@@ -5852,6 +5860,997 @@
 </p:sld>
 </file>
 
+<file path=ppt/slides/slide10.xml><?xml version="1.0" encoding="utf-8"?>
+<p:sld xmlns:a="http://schemas.openxmlformats.org/drawingml/2006/main" xmlns:r="http://schemas.openxmlformats.org/officeDocument/2006/relationships" xmlns:p="http://schemas.openxmlformats.org/presentationml/2006/main">
+  <p:cSld>
+    <p:spTree>
+      <p:nvGrpSpPr>
+        <p:cNvPr id="1" name=""/>
+        <p:cNvGrpSpPr/>
+        <p:nvPr/>
+      </p:nvGrpSpPr>
+      <p:grpSpPr>
+        <a:xfrm>
+          <a:off x="0" y="0"/>
+          <a:ext cx="0" cy="0"/>
+          <a:chOff x="0" y="0"/>
+          <a:chExt cx="0" cy="0"/>
+        </a:xfrm>
+      </p:grpSpPr>
+      <p:sp>
+        <p:nvSpPr>
+          <p:cNvPr id="2" name="Title 1">
+            <a:extLst>
+              <a:ext uri="{FF2B5EF4-FFF2-40B4-BE49-F238E27FC236}">
+                <a16:creationId xmlns:a16="http://schemas.microsoft.com/office/drawing/2014/main" id="{D7EBE005-9015-4481-8CC1-A55EC42446DB}"/>
+              </a:ext>
+            </a:extLst>
+          </p:cNvPr>
+          <p:cNvSpPr>
+            <a:spLocks noGrp="1"/>
+          </p:cNvSpPr>
+          <p:nvPr>
+            <p:ph type="title"/>
+          </p:nvPr>
+        </p:nvSpPr>
+        <p:spPr/>
+        <p:txBody>
+          <a:bodyPr/>
+          <a:lstStyle/>
+          <a:p>
+            <a:r>
+              <a:rPr lang="en-US" dirty="0"/>
+              <a:t>Using an Ensemble of Discriminators</a:t>
+            </a:r>
+          </a:p>
+        </p:txBody>
+      </p:sp>
+      <p:sp>
+        <p:nvSpPr>
+          <p:cNvPr id="3" name="Content Placeholder 2">
+            <a:extLst>
+              <a:ext uri="{FF2B5EF4-FFF2-40B4-BE49-F238E27FC236}">
+                <a16:creationId xmlns:a16="http://schemas.microsoft.com/office/drawing/2014/main" id="{D2F916F7-28A7-46EB-9D5F-4AB8F5B5BAED}"/>
+              </a:ext>
+            </a:extLst>
+          </p:cNvPr>
+          <p:cNvSpPr>
+            <a:spLocks noGrp="1"/>
+          </p:cNvSpPr>
+          <p:nvPr>
+            <p:ph idx="1"/>
+          </p:nvPr>
+        </p:nvSpPr>
+        <p:spPr>
+          <a:xfrm>
+            <a:off x="489859" y="1839946"/>
+            <a:ext cx="10131425" cy="1015222"/>
+          </a:xfrm>
+        </p:spPr>
+        <p:txBody>
+          <a:bodyPr>
+            <a:normAutofit fontScale="92500" lnSpcReduction="20000"/>
+          </a:bodyPr>
+          <a:lstStyle/>
+          <a:p>
+            <a:r>
+              <a:rPr lang="en-US" dirty="0"/>
+              <a:t>Trained two </a:t>
+            </a:r>
+            <a:r>
+              <a:rPr lang="en-US" dirty="0" err="1"/>
+              <a:t>CycleGANs</a:t>
+            </a:r>
+            <a:r>
+              <a:rPr lang="en-US" dirty="0"/>
+              <a:t>, A and B, in same way as paper</a:t>
+            </a:r>
+          </a:p>
+          <a:p>
+            <a:r>
+              <a:rPr lang="en-US" dirty="0"/>
+              <a:t>Used smaller generators and stronger preprocessing for faster training time.</a:t>
+            </a:r>
+          </a:p>
+          <a:p>
+            <a:r>
+              <a:rPr lang="en-US" dirty="0"/>
+              <a:t>Fine tuned generators from set A with an extra 20 epochs on discriminators from set B</a:t>
+            </a:r>
+          </a:p>
+        </p:txBody>
+      </p:sp>
+      <p:pic>
+        <p:nvPicPr>
+          <p:cNvPr id="5" name="Picture 4">
+            <a:extLst>
+              <a:ext uri="{FF2B5EF4-FFF2-40B4-BE49-F238E27FC236}">
+                <a16:creationId xmlns:a16="http://schemas.microsoft.com/office/drawing/2014/main" id="{1CD43925-4761-4419-ADD2-F032C5A1C1A0}"/>
+              </a:ext>
+            </a:extLst>
+          </p:cNvPr>
+          <p:cNvPicPr>
+            <a:picLocks noChangeAspect="1"/>
+          </p:cNvPicPr>
+          <p:nvPr/>
+        </p:nvPicPr>
+        <p:blipFill>
+          <a:blip r:embed="rId2"/>
+          <a:stretch>
+            <a:fillRect/>
+          </a:stretch>
+        </p:blipFill>
+        <p:spPr>
+          <a:xfrm>
+            <a:off x="2033551" y="4085514"/>
+            <a:ext cx="2228585" cy="2194560"/>
+          </a:xfrm>
+          <a:prstGeom prst="rect">
+            <a:avLst/>
+          </a:prstGeom>
+        </p:spPr>
+      </p:pic>
+      <p:pic>
+        <p:nvPicPr>
+          <p:cNvPr id="7" name="Picture 6">
+            <a:extLst>
+              <a:ext uri="{FF2B5EF4-FFF2-40B4-BE49-F238E27FC236}">
+                <a16:creationId xmlns:a16="http://schemas.microsoft.com/office/drawing/2014/main" id="{1B8E8D28-56A1-4C2A-923E-1DF9B039DE59}"/>
+              </a:ext>
+            </a:extLst>
+          </p:cNvPr>
+          <p:cNvPicPr>
+            <a:picLocks noChangeAspect="1"/>
+          </p:cNvPicPr>
+          <p:nvPr/>
+        </p:nvPicPr>
+        <p:blipFill>
+          <a:blip r:embed="rId3"/>
+          <a:stretch>
+            <a:fillRect/>
+          </a:stretch>
+        </p:blipFill>
+        <p:spPr>
+          <a:xfrm>
+            <a:off x="4964564" y="4085514"/>
+            <a:ext cx="2262872" cy="2194560"/>
+          </a:xfrm>
+          <a:prstGeom prst="rect">
+            <a:avLst/>
+          </a:prstGeom>
+        </p:spPr>
+      </p:pic>
+      <p:pic>
+        <p:nvPicPr>
+          <p:cNvPr id="9" name="Picture 8">
+            <a:extLst>
+              <a:ext uri="{FF2B5EF4-FFF2-40B4-BE49-F238E27FC236}">
+                <a16:creationId xmlns:a16="http://schemas.microsoft.com/office/drawing/2014/main" id="{CD9FEF2F-801A-4EEA-8A3A-77B4F61A8FD6}"/>
+              </a:ext>
+            </a:extLst>
+          </p:cNvPr>
+          <p:cNvPicPr>
+            <a:picLocks noChangeAspect="1"/>
+          </p:cNvPicPr>
+          <p:nvPr/>
+        </p:nvPicPr>
+        <p:blipFill>
+          <a:blip r:embed="rId4"/>
+          <a:stretch>
+            <a:fillRect/>
+          </a:stretch>
+        </p:blipFill>
+        <p:spPr>
+          <a:xfrm>
+            <a:off x="7938371" y="4085514"/>
+            <a:ext cx="2220078" cy="2194560"/>
+          </a:xfrm>
+          <a:prstGeom prst="rect">
+            <a:avLst/>
+          </a:prstGeom>
+        </p:spPr>
+      </p:pic>
+      <p:sp>
+        <p:nvSpPr>
+          <p:cNvPr id="10" name="TextBox 9">
+            <a:extLst>
+              <a:ext uri="{FF2B5EF4-FFF2-40B4-BE49-F238E27FC236}">
+                <a16:creationId xmlns:a16="http://schemas.microsoft.com/office/drawing/2014/main" id="{82C671C8-85C4-4C6E-BD69-CC094C1665AE}"/>
+              </a:ext>
+            </a:extLst>
+          </p:cNvPr>
+          <p:cNvSpPr txBox="1"/>
+          <p:nvPr/>
+        </p:nvSpPr>
+        <p:spPr>
+          <a:xfrm>
+            <a:off x="2375195" y="3463290"/>
+            <a:ext cx="1545295" cy="369332"/>
+          </a:xfrm>
+          <a:prstGeom prst="rect">
+            <a:avLst/>
+          </a:prstGeom>
+          <a:noFill/>
+        </p:spPr>
+        <p:txBody>
+          <a:bodyPr wrap="none" rtlCol="0">
+            <a:spAutoFit/>
+          </a:bodyPr>
+          <a:lstStyle/>
+          <a:p>
+            <a:r>
+              <a:rPr lang="en-US" dirty="0"/>
+              <a:t>Original Image</a:t>
+            </a:r>
+          </a:p>
+        </p:txBody>
+      </p:sp>
+      <p:sp>
+        <p:nvSpPr>
+          <p:cNvPr id="11" name="TextBox 10">
+            <a:extLst>
+              <a:ext uri="{FF2B5EF4-FFF2-40B4-BE49-F238E27FC236}">
+                <a16:creationId xmlns:a16="http://schemas.microsoft.com/office/drawing/2014/main" id="{C3827E02-2957-4310-863D-69F7B0CBCC04}"/>
+              </a:ext>
+            </a:extLst>
+          </p:cNvPr>
+          <p:cNvSpPr txBox="1"/>
+          <p:nvPr/>
+        </p:nvSpPr>
+        <p:spPr>
+          <a:xfrm>
+            <a:off x="5238040" y="3429000"/>
+            <a:ext cx="1715919" cy="369332"/>
+          </a:xfrm>
+          <a:prstGeom prst="rect">
+            <a:avLst/>
+          </a:prstGeom>
+          <a:noFill/>
+        </p:spPr>
+        <p:txBody>
+          <a:bodyPr wrap="none" rtlCol="0">
+            <a:spAutoFit/>
+          </a:bodyPr>
+          <a:lstStyle/>
+          <a:p>
+            <a:r>
+              <a:rPr lang="en-US" dirty="0"/>
+              <a:t>Zhu et al. (2020)</a:t>
+            </a:r>
+          </a:p>
+        </p:txBody>
+      </p:sp>
+      <p:sp>
+        <p:nvSpPr>
+          <p:cNvPr id="12" name="TextBox 11">
+            <a:extLst>
+              <a:ext uri="{FF2B5EF4-FFF2-40B4-BE49-F238E27FC236}">
+                <a16:creationId xmlns:a16="http://schemas.microsoft.com/office/drawing/2014/main" id="{C0D033EF-2604-4D40-8393-42FE537C2E0D}"/>
+              </a:ext>
+            </a:extLst>
+          </p:cNvPr>
+          <p:cNvSpPr txBox="1"/>
+          <p:nvPr/>
+        </p:nvSpPr>
+        <p:spPr>
+          <a:xfrm>
+            <a:off x="8034542" y="3356502"/>
+            <a:ext cx="2027735" cy="646331"/>
+          </a:xfrm>
+          <a:prstGeom prst="rect">
+            <a:avLst/>
+          </a:prstGeom>
+          <a:noFill/>
+        </p:spPr>
+        <p:txBody>
+          <a:bodyPr wrap="none" rtlCol="0">
+            <a:spAutoFit/>
+          </a:bodyPr>
+          <a:lstStyle/>
+          <a:p>
+            <a:r>
+              <a:rPr lang="en-US" dirty="0"/>
+              <a:t>With Regularization</a:t>
+            </a:r>
+          </a:p>
+          <a:p>
+            <a:pPr algn="ctr"/>
+            <a:r>
+              <a:rPr lang="en-US" dirty="0"/>
+              <a:t> Schedule</a:t>
+            </a:r>
+          </a:p>
+        </p:txBody>
+      </p:sp>
+    </p:spTree>
+    <p:extLst>
+      <p:ext uri="{BB962C8B-B14F-4D97-AF65-F5344CB8AC3E}">
+        <p14:creationId xmlns:p14="http://schemas.microsoft.com/office/powerpoint/2010/main" val="658575904"/>
+      </p:ext>
+    </p:extLst>
+  </p:cSld>
+  <p:clrMapOvr>
+    <a:masterClrMapping/>
+  </p:clrMapOvr>
+</p:sld>
+</file>
+
+<file path=ppt/slides/slide11.xml><?xml version="1.0" encoding="utf-8"?>
+<p:sld xmlns:a="http://schemas.openxmlformats.org/drawingml/2006/main" xmlns:r="http://schemas.openxmlformats.org/officeDocument/2006/relationships" xmlns:p="http://schemas.openxmlformats.org/presentationml/2006/main">
+  <p:cSld>
+    <p:spTree>
+      <p:nvGrpSpPr>
+        <p:cNvPr id="1" name=""/>
+        <p:cNvGrpSpPr/>
+        <p:nvPr/>
+      </p:nvGrpSpPr>
+      <p:grpSpPr>
+        <a:xfrm>
+          <a:off x="0" y="0"/>
+          <a:ext cx="0" cy="0"/>
+          <a:chOff x="0" y="0"/>
+          <a:chExt cx="0" cy="0"/>
+        </a:xfrm>
+      </p:grpSpPr>
+      <p:pic>
+        <p:nvPicPr>
+          <p:cNvPr id="5" name="Picture 4" descr="A picture containing grass, outdoor, horse, mammal&#10;&#10;Description automatically generated">
+            <a:extLst>
+              <a:ext uri="{FF2B5EF4-FFF2-40B4-BE49-F238E27FC236}">
+                <a16:creationId xmlns:a16="http://schemas.microsoft.com/office/drawing/2014/main" id="{69FBA210-2B69-45FC-B023-951857BF335D}"/>
+              </a:ext>
+            </a:extLst>
+          </p:cNvPr>
+          <p:cNvPicPr>
+            <a:picLocks noChangeAspect="1"/>
+          </p:cNvPicPr>
+          <p:nvPr/>
+        </p:nvPicPr>
+        <p:blipFill>
+          <a:blip r:embed="rId2"/>
+          <a:stretch>
+            <a:fillRect/>
+          </a:stretch>
+        </p:blipFill>
+        <p:spPr>
+          <a:xfrm>
+            <a:off x="2717995" y="648998"/>
+            <a:ext cx="1578674" cy="1554480"/>
+          </a:xfrm>
+          <a:prstGeom prst="rect">
+            <a:avLst/>
+          </a:prstGeom>
+        </p:spPr>
+      </p:pic>
+      <p:pic>
+        <p:nvPicPr>
+          <p:cNvPr id="7" name="Picture 6">
+            <a:extLst>
+              <a:ext uri="{FF2B5EF4-FFF2-40B4-BE49-F238E27FC236}">
+                <a16:creationId xmlns:a16="http://schemas.microsoft.com/office/drawing/2014/main" id="{F10D2599-4710-4CEC-BEA7-108DAE43BD3B}"/>
+              </a:ext>
+            </a:extLst>
+          </p:cNvPr>
+          <p:cNvPicPr>
+            <a:picLocks noChangeAspect="1"/>
+          </p:cNvPicPr>
+          <p:nvPr/>
+        </p:nvPicPr>
+        <p:blipFill>
+          <a:blip r:embed="rId3"/>
+          <a:stretch>
+            <a:fillRect/>
+          </a:stretch>
+        </p:blipFill>
+        <p:spPr>
+          <a:xfrm>
+            <a:off x="7312874" y="650953"/>
+            <a:ext cx="1578580" cy="1554480"/>
+          </a:xfrm>
+          <a:prstGeom prst="rect">
+            <a:avLst/>
+          </a:prstGeom>
+        </p:spPr>
+      </p:pic>
+      <p:pic>
+        <p:nvPicPr>
+          <p:cNvPr id="9" name="Picture 8">
+            <a:extLst>
+              <a:ext uri="{FF2B5EF4-FFF2-40B4-BE49-F238E27FC236}">
+                <a16:creationId xmlns:a16="http://schemas.microsoft.com/office/drawing/2014/main" id="{CFE72F35-3D6A-4769-8A80-28BD90D87220}"/>
+              </a:ext>
+            </a:extLst>
+          </p:cNvPr>
+          <p:cNvPicPr>
+            <a:picLocks noChangeAspect="1"/>
+          </p:cNvPicPr>
+          <p:nvPr/>
+        </p:nvPicPr>
+        <p:blipFill>
+          <a:blip r:embed="rId4"/>
+          <a:stretch>
+            <a:fillRect/>
+          </a:stretch>
+        </p:blipFill>
+        <p:spPr>
+          <a:xfrm>
+            <a:off x="4246901" y="651155"/>
+            <a:ext cx="1566767" cy="1554480"/>
+          </a:xfrm>
+          <a:prstGeom prst="rect">
+            <a:avLst/>
+          </a:prstGeom>
+        </p:spPr>
+      </p:pic>
+      <p:pic>
+        <p:nvPicPr>
+          <p:cNvPr id="11" name="Picture 10">
+            <a:extLst>
+              <a:ext uri="{FF2B5EF4-FFF2-40B4-BE49-F238E27FC236}">
+                <a16:creationId xmlns:a16="http://schemas.microsoft.com/office/drawing/2014/main" id="{24E52737-1C86-402E-8E68-55C82D4973C9}"/>
+              </a:ext>
+            </a:extLst>
+          </p:cNvPr>
+          <p:cNvPicPr>
+            <a:picLocks noChangeAspect="1"/>
+          </p:cNvPicPr>
+          <p:nvPr/>
+        </p:nvPicPr>
+        <p:blipFill>
+          <a:blip r:embed="rId5"/>
+          <a:stretch>
+            <a:fillRect/>
+          </a:stretch>
+        </p:blipFill>
+        <p:spPr>
+          <a:xfrm>
+            <a:off x="2730847" y="5301363"/>
+            <a:ext cx="1537706" cy="1554480"/>
+          </a:xfrm>
+          <a:prstGeom prst="rect">
+            <a:avLst/>
+          </a:prstGeom>
+        </p:spPr>
+      </p:pic>
+      <p:pic>
+        <p:nvPicPr>
+          <p:cNvPr id="13" name="Picture 12" descr="A picture containing grass, outdoor, standing, mammal&#10;&#10;Description automatically generated">
+            <a:extLst>
+              <a:ext uri="{FF2B5EF4-FFF2-40B4-BE49-F238E27FC236}">
+                <a16:creationId xmlns:a16="http://schemas.microsoft.com/office/drawing/2014/main" id="{27506948-82C7-45A9-8F71-C16402BDED6A}"/>
+              </a:ext>
+            </a:extLst>
+          </p:cNvPr>
+          <p:cNvPicPr>
+            <a:picLocks noChangeAspect="1"/>
+          </p:cNvPicPr>
+          <p:nvPr/>
+        </p:nvPicPr>
+        <p:blipFill>
+          <a:blip r:embed="rId6"/>
+          <a:stretch>
+            <a:fillRect/>
+          </a:stretch>
+        </p:blipFill>
+        <p:spPr>
+          <a:xfrm>
+            <a:off x="7328022" y="5290076"/>
+            <a:ext cx="1596987" cy="1554480"/>
+          </a:xfrm>
+          <a:prstGeom prst="rect">
+            <a:avLst/>
+          </a:prstGeom>
+        </p:spPr>
+      </p:pic>
+      <p:pic>
+        <p:nvPicPr>
+          <p:cNvPr id="15" name="Picture 14">
+            <a:extLst>
+              <a:ext uri="{FF2B5EF4-FFF2-40B4-BE49-F238E27FC236}">
+                <a16:creationId xmlns:a16="http://schemas.microsoft.com/office/drawing/2014/main" id="{7BBEF5F5-387E-404E-B587-BCC436EB22B7}"/>
+              </a:ext>
+            </a:extLst>
+          </p:cNvPr>
+          <p:cNvPicPr>
+            <a:picLocks noChangeAspect="1"/>
+          </p:cNvPicPr>
+          <p:nvPr/>
+        </p:nvPicPr>
+        <p:blipFill>
+          <a:blip r:embed="rId7"/>
+          <a:stretch>
+            <a:fillRect/>
+          </a:stretch>
+        </p:blipFill>
+        <p:spPr>
+          <a:xfrm>
+            <a:off x="4259926" y="5303520"/>
+            <a:ext cx="1515339" cy="1554480"/>
+          </a:xfrm>
+          <a:prstGeom prst="rect">
+            <a:avLst/>
+          </a:prstGeom>
+        </p:spPr>
+      </p:pic>
+      <p:pic>
+        <p:nvPicPr>
+          <p:cNvPr id="17" name="Picture 16">
+            <a:extLst>
+              <a:ext uri="{FF2B5EF4-FFF2-40B4-BE49-F238E27FC236}">
+                <a16:creationId xmlns:a16="http://schemas.microsoft.com/office/drawing/2014/main" id="{83DDE3AD-DED5-41EC-909F-112C3A7234BA}"/>
+              </a:ext>
+            </a:extLst>
+          </p:cNvPr>
+          <p:cNvPicPr>
+            <a:picLocks noChangeAspect="1"/>
+          </p:cNvPicPr>
+          <p:nvPr/>
+        </p:nvPicPr>
+        <p:blipFill>
+          <a:blip r:embed="rId8"/>
+          <a:stretch>
+            <a:fillRect/>
+          </a:stretch>
+        </p:blipFill>
+        <p:spPr>
+          <a:xfrm>
+            <a:off x="2721017" y="2203478"/>
+            <a:ext cx="1572629" cy="1554480"/>
+          </a:xfrm>
+          <a:prstGeom prst="rect">
+            <a:avLst/>
+          </a:prstGeom>
+        </p:spPr>
+      </p:pic>
+      <p:pic>
+        <p:nvPicPr>
+          <p:cNvPr id="19" name="Picture 18">
+            <a:extLst>
+              <a:ext uri="{FF2B5EF4-FFF2-40B4-BE49-F238E27FC236}">
+                <a16:creationId xmlns:a16="http://schemas.microsoft.com/office/drawing/2014/main" id="{E9E375C5-F7D7-46EB-AC1E-0C4C7F6CADD0}"/>
+              </a:ext>
+            </a:extLst>
+          </p:cNvPr>
+          <p:cNvPicPr>
+            <a:picLocks noChangeAspect="1"/>
+          </p:cNvPicPr>
+          <p:nvPr/>
+        </p:nvPicPr>
+        <p:blipFill>
+          <a:blip r:embed="rId9"/>
+          <a:stretch>
+            <a:fillRect/>
+          </a:stretch>
+        </p:blipFill>
+        <p:spPr>
+          <a:xfrm>
+            <a:off x="5789859" y="2196122"/>
+            <a:ext cx="1578580" cy="1554480"/>
+          </a:xfrm>
+          <a:prstGeom prst="rect">
+            <a:avLst/>
+          </a:prstGeom>
+        </p:spPr>
+      </p:pic>
+      <p:pic>
+        <p:nvPicPr>
+          <p:cNvPr id="21" name="Picture 20">
+            <a:extLst>
+              <a:ext uri="{FF2B5EF4-FFF2-40B4-BE49-F238E27FC236}">
+                <a16:creationId xmlns:a16="http://schemas.microsoft.com/office/drawing/2014/main" id="{E4D2C3FD-76B5-409A-8F71-D5191F1BF02E}"/>
+              </a:ext>
+            </a:extLst>
+          </p:cNvPr>
+          <p:cNvPicPr>
+            <a:picLocks noChangeAspect="1"/>
+          </p:cNvPicPr>
+          <p:nvPr/>
+        </p:nvPicPr>
+        <p:blipFill>
+          <a:blip r:embed="rId10"/>
+          <a:stretch>
+            <a:fillRect/>
+          </a:stretch>
+        </p:blipFill>
+        <p:spPr>
+          <a:xfrm>
+            <a:off x="4249049" y="2205635"/>
+            <a:ext cx="1572697" cy="1554480"/>
+          </a:xfrm>
+          <a:prstGeom prst="rect">
+            <a:avLst/>
+          </a:prstGeom>
+        </p:spPr>
+      </p:pic>
+      <p:pic>
+        <p:nvPicPr>
+          <p:cNvPr id="23" name="Picture 22">
+            <a:extLst>
+              <a:ext uri="{FF2B5EF4-FFF2-40B4-BE49-F238E27FC236}">
+                <a16:creationId xmlns:a16="http://schemas.microsoft.com/office/drawing/2014/main" id="{4BFF9740-1FDB-4BDC-955E-CC428D5185A6}"/>
+              </a:ext>
+            </a:extLst>
+          </p:cNvPr>
+          <p:cNvPicPr>
+            <a:picLocks noChangeAspect="1"/>
+          </p:cNvPicPr>
+          <p:nvPr/>
+        </p:nvPicPr>
+        <p:blipFill>
+          <a:blip r:embed="rId11"/>
+          <a:stretch>
+            <a:fillRect/>
+          </a:stretch>
+        </p:blipFill>
+        <p:spPr>
+          <a:xfrm>
+            <a:off x="2727628" y="3755801"/>
+            <a:ext cx="1578581" cy="1554480"/>
+          </a:xfrm>
+          <a:prstGeom prst="rect">
+            <a:avLst/>
+          </a:prstGeom>
+        </p:spPr>
+      </p:pic>
+      <p:pic>
+        <p:nvPicPr>
+          <p:cNvPr id="27" name="Picture 26">
+            <a:extLst>
+              <a:ext uri="{FF2B5EF4-FFF2-40B4-BE49-F238E27FC236}">
+                <a16:creationId xmlns:a16="http://schemas.microsoft.com/office/drawing/2014/main" id="{73D7EE0F-FD96-4AF7-90D6-056888B368D3}"/>
+              </a:ext>
+            </a:extLst>
+          </p:cNvPr>
+          <p:cNvPicPr>
+            <a:picLocks noChangeAspect="1"/>
+          </p:cNvPicPr>
+          <p:nvPr/>
+        </p:nvPicPr>
+        <p:blipFill>
+          <a:blip r:embed="rId12"/>
+          <a:stretch>
+            <a:fillRect/>
+          </a:stretch>
+        </p:blipFill>
+        <p:spPr>
+          <a:xfrm>
+            <a:off x="4234990" y="3757958"/>
+            <a:ext cx="1602868" cy="1554480"/>
+          </a:xfrm>
+          <a:prstGeom prst="rect">
+            <a:avLst/>
+          </a:prstGeom>
+        </p:spPr>
+      </p:pic>
+      <p:pic>
+        <p:nvPicPr>
+          <p:cNvPr id="29" name="Picture 28">
+            <a:extLst>
+              <a:ext uri="{FF2B5EF4-FFF2-40B4-BE49-F238E27FC236}">
+                <a16:creationId xmlns:a16="http://schemas.microsoft.com/office/drawing/2014/main" id="{A27B7FF6-944C-449F-97D6-0E09402E1DAA}"/>
+              </a:ext>
+            </a:extLst>
+          </p:cNvPr>
+          <p:cNvPicPr>
+            <a:picLocks noChangeAspect="1"/>
+          </p:cNvPicPr>
+          <p:nvPr/>
+        </p:nvPicPr>
+        <p:blipFill>
+          <a:blip r:embed="rId13"/>
+          <a:stretch>
+            <a:fillRect/>
+          </a:stretch>
+        </p:blipFill>
+        <p:spPr>
+          <a:xfrm>
+            <a:off x="5789859" y="641642"/>
+            <a:ext cx="1572555" cy="1554480"/>
+          </a:xfrm>
+          <a:prstGeom prst="rect">
+            <a:avLst/>
+          </a:prstGeom>
+        </p:spPr>
+      </p:pic>
+      <p:pic>
+        <p:nvPicPr>
+          <p:cNvPr id="31" name="Picture 30">
+            <a:extLst>
+              <a:ext uri="{FF2B5EF4-FFF2-40B4-BE49-F238E27FC236}">
+                <a16:creationId xmlns:a16="http://schemas.microsoft.com/office/drawing/2014/main" id="{6126E356-5B23-4E19-87DD-E5C5B5D2BCBF}"/>
+              </a:ext>
+            </a:extLst>
+          </p:cNvPr>
+          <p:cNvPicPr>
+            <a:picLocks noChangeAspect="1"/>
+          </p:cNvPicPr>
+          <p:nvPr/>
+        </p:nvPicPr>
+        <p:blipFill>
+          <a:blip r:embed="rId14"/>
+          <a:stretch>
+            <a:fillRect/>
+          </a:stretch>
+        </p:blipFill>
+        <p:spPr>
+          <a:xfrm>
+            <a:off x="5783810" y="5301363"/>
+            <a:ext cx="1572556" cy="1554480"/>
+          </a:xfrm>
+          <a:prstGeom prst="rect">
+            <a:avLst/>
+          </a:prstGeom>
+        </p:spPr>
+      </p:pic>
+      <p:pic>
+        <p:nvPicPr>
+          <p:cNvPr id="33" name="Picture 32">
+            <a:extLst>
+              <a:ext uri="{FF2B5EF4-FFF2-40B4-BE49-F238E27FC236}">
+                <a16:creationId xmlns:a16="http://schemas.microsoft.com/office/drawing/2014/main" id="{6AB4BE9E-F7C7-4D91-AEBC-3D9FF3125CB3}"/>
+              </a:ext>
+            </a:extLst>
+          </p:cNvPr>
+          <p:cNvPicPr>
+            <a:picLocks noChangeAspect="1"/>
+          </p:cNvPicPr>
+          <p:nvPr/>
+        </p:nvPicPr>
+        <p:blipFill>
+          <a:blip r:embed="rId15"/>
+          <a:stretch>
+            <a:fillRect/>
+          </a:stretch>
+        </p:blipFill>
+        <p:spPr>
+          <a:xfrm>
+            <a:off x="7356366" y="2222100"/>
+            <a:ext cx="1513571" cy="1554480"/>
+          </a:xfrm>
+          <a:prstGeom prst="rect">
+            <a:avLst/>
+          </a:prstGeom>
+        </p:spPr>
+      </p:pic>
+      <p:sp>
+        <p:nvSpPr>
+          <p:cNvPr id="36" name="TextBox 35">
+            <a:extLst>
+              <a:ext uri="{FF2B5EF4-FFF2-40B4-BE49-F238E27FC236}">
+                <a16:creationId xmlns:a16="http://schemas.microsoft.com/office/drawing/2014/main" id="{D4124411-F0E9-4240-A345-175C1D73177A}"/>
+              </a:ext>
+            </a:extLst>
+          </p:cNvPr>
+          <p:cNvSpPr txBox="1"/>
+          <p:nvPr/>
+        </p:nvSpPr>
+        <p:spPr>
+          <a:xfrm>
+            <a:off x="2723258" y="165178"/>
+            <a:ext cx="1396408" cy="369332"/>
+          </a:xfrm>
+          <a:prstGeom prst="rect">
+            <a:avLst/>
+          </a:prstGeom>
+          <a:noFill/>
+        </p:spPr>
+        <p:txBody>
+          <a:bodyPr wrap="none" rtlCol="0">
+            <a:spAutoFit/>
+          </a:bodyPr>
+          <a:lstStyle/>
+          <a:p>
+            <a:r>
+              <a:rPr lang="en-US" sz="1600" dirty="0"/>
+              <a:t>Original</a:t>
+            </a:r>
+            <a:r>
+              <a:rPr lang="en-US" dirty="0"/>
+              <a:t> </a:t>
+            </a:r>
+            <a:r>
+              <a:rPr lang="en-US" sz="1600" dirty="0"/>
+              <a:t>Image</a:t>
+            </a:r>
+          </a:p>
+        </p:txBody>
+      </p:sp>
+      <p:sp>
+        <p:nvSpPr>
+          <p:cNvPr id="37" name="TextBox 36">
+            <a:extLst>
+              <a:ext uri="{FF2B5EF4-FFF2-40B4-BE49-F238E27FC236}">
+                <a16:creationId xmlns:a16="http://schemas.microsoft.com/office/drawing/2014/main" id="{07F62BCF-56C3-4759-B9E0-F707CC398D14}"/>
+              </a:ext>
+            </a:extLst>
+          </p:cNvPr>
+          <p:cNvSpPr txBox="1"/>
+          <p:nvPr/>
+        </p:nvSpPr>
+        <p:spPr>
+          <a:xfrm>
+            <a:off x="4214885" y="290741"/>
+            <a:ext cx="1663019" cy="369332"/>
+          </a:xfrm>
+          <a:prstGeom prst="rect">
+            <a:avLst/>
+          </a:prstGeom>
+          <a:noFill/>
+        </p:spPr>
+        <p:txBody>
+          <a:bodyPr wrap="none" rtlCol="0">
+            <a:spAutoFit/>
+          </a:bodyPr>
+          <a:lstStyle/>
+          <a:p>
+            <a:r>
+              <a:rPr lang="en-US" sz="1600" dirty="0"/>
+              <a:t>Zhu</a:t>
+            </a:r>
+            <a:r>
+              <a:rPr lang="en-US" dirty="0"/>
+              <a:t> et al.(2020)</a:t>
+            </a:r>
+          </a:p>
+        </p:txBody>
+      </p:sp>
+      <p:sp>
+        <p:nvSpPr>
+          <p:cNvPr id="38" name="TextBox 37">
+            <a:extLst>
+              <a:ext uri="{FF2B5EF4-FFF2-40B4-BE49-F238E27FC236}">
+                <a16:creationId xmlns:a16="http://schemas.microsoft.com/office/drawing/2014/main" id="{DE5A20C4-CF74-4C37-9708-1A8BB6399B49}"/>
+              </a:ext>
+            </a:extLst>
+          </p:cNvPr>
+          <p:cNvSpPr txBox="1"/>
+          <p:nvPr/>
+        </p:nvSpPr>
+        <p:spPr>
+          <a:xfrm>
+            <a:off x="7492924" y="92156"/>
+            <a:ext cx="1304460" cy="584775"/>
+          </a:xfrm>
+          <a:prstGeom prst="rect">
+            <a:avLst/>
+          </a:prstGeom>
+          <a:noFill/>
+        </p:spPr>
+        <p:txBody>
+          <a:bodyPr wrap="none" rtlCol="0">
+            <a:spAutoFit/>
+          </a:bodyPr>
+          <a:lstStyle/>
+          <a:p>
+            <a:r>
+              <a:rPr lang="en-US" sz="1600" dirty="0"/>
+              <a:t>Discriminator</a:t>
+            </a:r>
+          </a:p>
+          <a:p>
+            <a:pPr algn="ctr"/>
+            <a:r>
+              <a:rPr lang="en-US" sz="1600" dirty="0"/>
+              <a:t>Ensemble</a:t>
+            </a:r>
+          </a:p>
+        </p:txBody>
+      </p:sp>
+      <p:sp>
+        <p:nvSpPr>
+          <p:cNvPr id="39" name="TextBox 38">
+            <a:extLst>
+              <a:ext uri="{FF2B5EF4-FFF2-40B4-BE49-F238E27FC236}">
+                <a16:creationId xmlns:a16="http://schemas.microsoft.com/office/drawing/2014/main" id="{5860EB0D-4EF7-4939-84AD-4346534E980E}"/>
+              </a:ext>
+            </a:extLst>
+          </p:cNvPr>
+          <p:cNvSpPr txBox="1"/>
+          <p:nvPr/>
+        </p:nvSpPr>
+        <p:spPr>
+          <a:xfrm>
+            <a:off x="5638410" y="29002"/>
+            <a:ext cx="1820435" cy="584775"/>
+          </a:xfrm>
+          <a:prstGeom prst="rect">
+            <a:avLst/>
+          </a:prstGeom>
+          <a:noFill/>
+        </p:spPr>
+        <p:txBody>
+          <a:bodyPr wrap="none" rtlCol="0">
+            <a:spAutoFit/>
+          </a:bodyPr>
+          <a:lstStyle/>
+          <a:p>
+            <a:r>
+              <a:rPr lang="en-US" sz="1600" dirty="0"/>
+              <a:t>With Regularization</a:t>
+            </a:r>
+          </a:p>
+          <a:p>
+            <a:pPr algn="ctr"/>
+            <a:r>
+              <a:rPr lang="en-US" sz="1600" dirty="0"/>
+              <a:t> Schedule</a:t>
+            </a:r>
+          </a:p>
+        </p:txBody>
+      </p:sp>
+      <p:pic>
+        <p:nvPicPr>
+          <p:cNvPr id="25" name="Picture 24">
+            <a:extLst>
+              <a:ext uri="{FF2B5EF4-FFF2-40B4-BE49-F238E27FC236}">
+                <a16:creationId xmlns:a16="http://schemas.microsoft.com/office/drawing/2014/main" id="{038C465B-2ECC-4122-9F38-930BD2233B64}"/>
+              </a:ext>
+            </a:extLst>
+          </p:cNvPr>
+          <p:cNvPicPr>
+            <a:picLocks noChangeAspect="1"/>
+          </p:cNvPicPr>
+          <p:nvPr/>
+        </p:nvPicPr>
+        <p:blipFill>
+          <a:blip r:embed="rId16"/>
+          <a:stretch>
+            <a:fillRect/>
+          </a:stretch>
+        </p:blipFill>
+        <p:spPr>
+          <a:xfrm>
+            <a:off x="5783810" y="3739527"/>
+            <a:ext cx="1609560" cy="1554480"/>
+          </a:xfrm>
+          <a:prstGeom prst="rect">
+            <a:avLst/>
+          </a:prstGeom>
+        </p:spPr>
+      </p:pic>
+      <p:pic>
+        <p:nvPicPr>
+          <p:cNvPr id="35" name="Picture 34">
+            <a:extLst>
+              <a:ext uri="{FF2B5EF4-FFF2-40B4-BE49-F238E27FC236}">
+                <a16:creationId xmlns:a16="http://schemas.microsoft.com/office/drawing/2014/main" id="{D660A9C8-8CCE-490E-8026-941C44600050}"/>
+              </a:ext>
+            </a:extLst>
+          </p:cNvPr>
+          <p:cNvPicPr>
+            <a:picLocks noChangeAspect="1"/>
+          </p:cNvPicPr>
+          <p:nvPr/>
+        </p:nvPicPr>
+        <p:blipFill>
+          <a:blip r:embed="rId17"/>
+          <a:stretch>
+            <a:fillRect/>
+          </a:stretch>
+        </p:blipFill>
+        <p:spPr>
+          <a:xfrm>
+            <a:off x="7318898" y="3756194"/>
+            <a:ext cx="1572556" cy="1554480"/>
+          </a:xfrm>
+          <a:prstGeom prst="rect">
+            <a:avLst/>
+          </a:prstGeom>
+        </p:spPr>
+      </p:pic>
+    </p:spTree>
+    <p:extLst>
+      <p:ext uri="{BB962C8B-B14F-4D97-AF65-F5344CB8AC3E}">
+        <p14:creationId xmlns:p14="http://schemas.microsoft.com/office/powerpoint/2010/main" val="256872782"/>
+      </p:ext>
+    </p:extLst>
+  </p:cSld>
+  <p:clrMapOvr>
+    <a:masterClrMapping/>
+  </p:clrMapOvr>
+</p:sld>
+</file>
+
 <file path=ppt/slides/slide2.xml><?xml version="1.0" encoding="utf-8"?>
 <p:sld xmlns:a="http://schemas.openxmlformats.org/drawingml/2006/main" xmlns:r="http://schemas.openxmlformats.org/officeDocument/2006/relationships" xmlns:p="http://schemas.openxmlformats.org/presentationml/2006/main">
   <p:cSld>
@@ -5957,6 +6956,544 @@
           <p:cNvPr id="2" name="Title 1">
             <a:extLst>
               <a:ext uri="{FF2B5EF4-FFF2-40B4-BE49-F238E27FC236}">
+                <a16:creationId xmlns:a16="http://schemas.microsoft.com/office/drawing/2014/main" id="{A33584BD-B4E3-4E53-BCDD-541DAACB6B46}"/>
+              </a:ext>
+            </a:extLst>
+          </p:cNvPr>
+          <p:cNvSpPr>
+            <a:spLocks noGrp="1"/>
+          </p:cNvSpPr>
+          <p:nvPr>
+            <p:ph type="title"/>
+          </p:nvPr>
+        </p:nvSpPr>
+        <p:spPr/>
+        <p:txBody>
+          <a:bodyPr/>
+          <a:lstStyle/>
+          <a:p>
+            <a:r>
+              <a:rPr lang="en-CA" dirty="0"/>
+              <a:t>Discriminator Experiment</a:t>
+            </a:r>
+            <a:endParaRPr lang="fr-CA" dirty="0"/>
+          </a:p>
+        </p:txBody>
+      </p:sp>
+      <p:sp>
+        <p:nvSpPr>
+          <p:cNvPr id="3" name="Content Placeholder 2">
+            <a:extLst>
+              <a:ext uri="{FF2B5EF4-FFF2-40B4-BE49-F238E27FC236}">
+                <a16:creationId xmlns:a16="http://schemas.microsoft.com/office/drawing/2014/main" id="{4529E6F2-2535-4DF5-9D46-60CAA3215563}"/>
+              </a:ext>
+            </a:extLst>
+          </p:cNvPr>
+          <p:cNvSpPr>
+            <a:spLocks noGrp="1"/>
+          </p:cNvSpPr>
+          <p:nvPr>
+            <p:ph idx="1"/>
+          </p:nvPr>
+        </p:nvSpPr>
+        <p:spPr/>
+        <p:txBody>
+          <a:bodyPr anchor="t">
+            <a:normAutofit fontScale="92500" lnSpcReduction="10000"/>
+          </a:bodyPr>
+          <a:lstStyle/>
+          <a:p>
+            <a:pPr marL="0" indent="0">
+              <a:buNone/>
+            </a:pPr>
+            <a:r>
+              <a:rPr lang="en-CA" dirty="0"/>
+              <a:t>Standard GAN discriminator (SGAN) used in original paper</a:t>
+            </a:r>
+          </a:p>
+          <a:p>
+            <a:pPr lvl="1">
+              <a:buFont typeface="Arial" panose="020B0604020202020204" pitchFamily="34" charset="0"/>
+              <a:buChar char="•"/>
+            </a:pPr>
+            <a:r>
+              <a:rPr lang="en-CA" dirty="0"/>
+              <a:t>Discriminator maximises capacity to distinguish real from fake images</a:t>
+            </a:r>
+          </a:p>
+          <a:p>
+            <a:pPr lvl="1">
+              <a:buFont typeface="Arial" panose="020B0604020202020204" pitchFamily="34" charset="0"/>
+              <a:buChar char="•"/>
+            </a:pPr>
+            <a:r>
+              <a:rPr lang="en-CA" dirty="0"/>
+              <a:t>Looking to optimise D(x) = 0 for fake images and D(x) = 1 for real images</a:t>
+            </a:r>
+          </a:p>
+          <a:p>
+            <a:pPr marL="0" indent="0">
+              <a:buNone/>
+            </a:pPr>
+            <a:r>
+              <a:rPr lang="en-CA" dirty="0"/>
+              <a:t>Problem </a:t>
+            </a:r>
+          </a:p>
+          <a:p>
+            <a:pPr lvl="1">
+              <a:buFont typeface="Arial" panose="020B0604020202020204" pitchFamily="34" charset="0"/>
+              <a:buChar char="•"/>
+            </a:pPr>
+            <a:r>
+              <a:rPr lang="en-US" dirty="0"/>
+              <a:t>For high resolution images there is high degree of freedom, makes it easy for d(x) = 0</a:t>
+            </a:r>
+          </a:p>
+          <a:p>
+            <a:pPr lvl="1">
+              <a:buFont typeface="Arial" panose="020B0604020202020204" pitchFamily="34" charset="0"/>
+              <a:buChar char="•"/>
+            </a:pPr>
+            <a:r>
+              <a:rPr lang="en-US" dirty="0"/>
+              <a:t>It hurts performance and stability because it can lead to greedy optimization</a:t>
+            </a:r>
+          </a:p>
+          <a:p>
+            <a:pPr lvl="1">
+              <a:buFont typeface="Arial" panose="020B0604020202020204" pitchFamily="34" charset="0"/>
+              <a:buChar char="•"/>
+            </a:pPr>
+            <a:r>
+              <a:rPr lang="en-CA" dirty="0"/>
+              <a:t>Due to </a:t>
+            </a:r>
+            <a:r>
+              <a:rPr lang="en-US" dirty="0"/>
+              <a:t>gradient,  that SGAN is learning mostly from fake images, not trying to make it look more natural</a:t>
+            </a:r>
+            <a:endParaRPr lang="en-CA" dirty="0"/>
+          </a:p>
+          <a:p>
+            <a:pPr lvl="1">
+              <a:buFontTx/>
+              <a:buChar char="-"/>
+            </a:pPr>
+            <a:endParaRPr lang="en-CA" dirty="0"/>
+          </a:p>
+          <a:p>
+            <a:pPr>
+              <a:buFontTx/>
+              <a:buChar char="-"/>
+            </a:pPr>
+            <a:endParaRPr lang="en-CA" dirty="0"/>
+          </a:p>
+          <a:p>
+            <a:pPr marL="0" indent="0">
+              <a:buNone/>
+            </a:pPr>
+            <a:br>
+              <a:rPr lang="en-CA" dirty="0"/>
+            </a:br>
+            <a:endParaRPr lang="fr-CA" dirty="0"/>
+          </a:p>
+        </p:txBody>
+      </p:sp>
+    </p:spTree>
+    <p:extLst>
+      <p:ext uri="{BB962C8B-B14F-4D97-AF65-F5344CB8AC3E}">
+        <p14:creationId xmlns:p14="http://schemas.microsoft.com/office/powerpoint/2010/main" val="1902990026"/>
+      </p:ext>
+    </p:extLst>
+  </p:cSld>
+  <p:clrMapOvr>
+    <a:masterClrMapping/>
+  </p:clrMapOvr>
+</p:sld>
+</file>
+
+<file path=ppt/slides/slide4.xml><?xml version="1.0" encoding="utf-8"?>
+<p:sld xmlns:a="http://schemas.openxmlformats.org/drawingml/2006/main" xmlns:r="http://schemas.openxmlformats.org/officeDocument/2006/relationships" xmlns:p="http://schemas.openxmlformats.org/presentationml/2006/main">
+  <p:cSld>
+    <p:spTree>
+      <p:nvGrpSpPr>
+        <p:cNvPr id="1" name=""/>
+        <p:cNvGrpSpPr/>
+        <p:nvPr/>
+      </p:nvGrpSpPr>
+      <p:grpSpPr>
+        <a:xfrm>
+          <a:off x="0" y="0"/>
+          <a:ext cx="0" cy="0"/>
+          <a:chOff x="0" y="0"/>
+          <a:chExt cx="0" cy="0"/>
+        </a:xfrm>
+      </p:grpSpPr>
+      <p:sp>
+        <p:nvSpPr>
+          <p:cNvPr id="2" name="Title 1">
+            <a:extLst>
+              <a:ext uri="{FF2B5EF4-FFF2-40B4-BE49-F238E27FC236}">
+                <a16:creationId xmlns:a16="http://schemas.microsoft.com/office/drawing/2014/main" id="{697DD2FD-1300-4E14-97EA-26082608D7E8}"/>
+              </a:ext>
+            </a:extLst>
+          </p:cNvPr>
+          <p:cNvSpPr>
+            <a:spLocks noGrp="1"/>
+          </p:cNvSpPr>
+          <p:nvPr>
+            <p:ph type="title"/>
+          </p:nvPr>
+        </p:nvSpPr>
+        <p:spPr/>
+        <p:txBody>
+          <a:bodyPr/>
+          <a:lstStyle/>
+          <a:p>
+            <a:r>
+              <a:rPr lang="en-CA" dirty="0"/>
+              <a:t>Relativistic Discriminator</a:t>
+            </a:r>
+            <a:endParaRPr lang="fr-CA" dirty="0"/>
+          </a:p>
+        </p:txBody>
+      </p:sp>
+      <p:sp>
+        <p:nvSpPr>
+          <p:cNvPr id="3" name="Content Placeholder 2">
+            <a:extLst>
+              <a:ext uri="{FF2B5EF4-FFF2-40B4-BE49-F238E27FC236}">
+                <a16:creationId xmlns:a16="http://schemas.microsoft.com/office/drawing/2014/main" id="{1AC3914C-D10D-4877-96E4-6F98297E417B}"/>
+              </a:ext>
+            </a:extLst>
+          </p:cNvPr>
+          <p:cNvSpPr>
+            <a:spLocks noGrp="1"/>
+          </p:cNvSpPr>
+          <p:nvPr>
+            <p:ph idx="1"/>
+          </p:nvPr>
+        </p:nvSpPr>
+        <p:spPr/>
+        <p:txBody>
+          <a:bodyPr anchor="t"/>
+          <a:lstStyle/>
+          <a:p>
+            <a:r>
+              <a:rPr lang="en-US" dirty="0"/>
+              <a:t>Measure the difference in between real and fake images D(</a:t>
+            </a:r>
+            <a:r>
+              <a:rPr lang="en-US" dirty="0" err="1"/>
+              <a:t>xr</a:t>
+            </a:r>
+            <a:r>
+              <a:rPr lang="en-US" dirty="0"/>
+              <a:t> –</a:t>
+            </a:r>
+            <a:r>
+              <a:rPr lang="en-US" dirty="0" err="1"/>
+              <a:t>xf</a:t>
+            </a:r>
+            <a:r>
+              <a:rPr lang="en-US"/>
+              <a:t>)</a:t>
+            </a:r>
+            <a:endParaRPr lang="en-US" dirty="0"/>
+          </a:p>
+          <a:p>
+            <a:r>
+              <a:rPr lang="en-US" dirty="0"/>
+              <a:t>Means it scores the fake differently subject to how "natural" the fakes are</a:t>
+            </a:r>
+          </a:p>
+          <a:p>
+            <a:r>
+              <a:rPr lang="en-US" dirty="0"/>
+              <a:t>Harder for the discriminator model to overfit, balances training between generator and discriminator better</a:t>
+            </a:r>
+          </a:p>
+          <a:p>
+            <a:r>
+              <a:rPr lang="en-US" dirty="0"/>
+              <a:t>Relativistic GANs measures the probability that the real data is more realistic than the generated data (or vice versa)</a:t>
+            </a:r>
+          </a:p>
+          <a:p>
+            <a:r>
+              <a:rPr lang="en-US" dirty="0"/>
+              <a:t>Ultimately D(x) = 0.5 As in the discriminator has random odds of detecting fakes</a:t>
+            </a:r>
+          </a:p>
+          <a:p>
+            <a:endParaRPr lang="fr-CA" dirty="0"/>
+          </a:p>
+        </p:txBody>
+      </p:sp>
+    </p:spTree>
+    <p:extLst>
+      <p:ext uri="{BB962C8B-B14F-4D97-AF65-F5344CB8AC3E}">
+        <p14:creationId xmlns:p14="http://schemas.microsoft.com/office/powerpoint/2010/main" val="2194609909"/>
+      </p:ext>
+    </p:extLst>
+  </p:cSld>
+  <p:clrMapOvr>
+    <a:masterClrMapping/>
+  </p:clrMapOvr>
+</p:sld>
+</file>
+
+<file path=ppt/slides/slide5.xml><?xml version="1.0" encoding="utf-8"?>
+<p:sld xmlns:a="http://schemas.openxmlformats.org/drawingml/2006/main" xmlns:r="http://schemas.openxmlformats.org/officeDocument/2006/relationships" xmlns:p="http://schemas.openxmlformats.org/presentationml/2006/main">
+  <p:cSld>
+    <p:spTree>
+      <p:nvGrpSpPr>
+        <p:cNvPr id="1" name=""/>
+        <p:cNvGrpSpPr/>
+        <p:nvPr/>
+      </p:nvGrpSpPr>
+      <p:grpSpPr>
+        <a:xfrm>
+          <a:off x="0" y="0"/>
+          <a:ext cx="0" cy="0"/>
+          <a:chOff x="0" y="0"/>
+          <a:chExt cx="0" cy="0"/>
+        </a:xfrm>
+      </p:grpSpPr>
+      <p:sp>
+        <p:nvSpPr>
+          <p:cNvPr id="2" name="Title 1">
+            <a:extLst>
+              <a:ext uri="{FF2B5EF4-FFF2-40B4-BE49-F238E27FC236}">
+                <a16:creationId xmlns:a16="http://schemas.microsoft.com/office/drawing/2014/main" id="{CA1783EB-2361-4D46-B47F-9389EEA3C54B}"/>
+              </a:ext>
+            </a:extLst>
+          </p:cNvPr>
+          <p:cNvSpPr>
+            <a:spLocks noGrp="1"/>
+          </p:cNvSpPr>
+          <p:nvPr>
+            <p:ph type="title"/>
+          </p:nvPr>
+        </p:nvSpPr>
+        <p:spPr>
+          <a:xfrm>
+            <a:off x="671566" y="220494"/>
+            <a:ext cx="10131425" cy="1456267"/>
+          </a:xfrm>
+        </p:spPr>
+        <p:txBody>
+          <a:bodyPr/>
+          <a:lstStyle/>
+          <a:p>
+            <a:r>
+              <a:rPr lang="en-CA" dirty="0"/>
+              <a:t>Transformation and results</a:t>
+            </a:r>
+            <a:endParaRPr lang="fr-CA" dirty="0"/>
+          </a:p>
+        </p:txBody>
+      </p:sp>
+      <p:pic>
+        <p:nvPicPr>
+          <p:cNvPr id="4" name="Content Placeholder 3">
+            <a:extLst>
+              <a:ext uri="{FF2B5EF4-FFF2-40B4-BE49-F238E27FC236}">
+                <a16:creationId xmlns:a16="http://schemas.microsoft.com/office/drawing/2014/main" id="{91490D68-7C4D-442E-B7E6-9DCE4CCB7560}"/>
+              </a:ext>
+            </a:extLst>
+          </p:cNvPr>
+          <p:cNvPicPr>
+            <a:picLocks noGrp="1" noChangeAspect="1"/>
+          </p:cNvPicPr>
+          <p:nvPr>
+            <p:ph idx="1"/>
+          </p:nvPr>
+        </p:nvPicPr>
+        <p:blipFill>
+          <a:blip r:embed="rId2"/>
+          <a:stretch>
+            <a:fillRect/>
+          </a:stretch>
+        </p:blipFill>
+        <p:spPr>
+          <a:xfrm>
+            <a:off x="427161" y="2141539"/>
+            <a:ext cx="5310118" cy="4161985"/>
+          </a:xfrm>
+          <a:prstGeom prst="rect">
+            <a:avLst/>
+          </a:prstGeom>
+        </p:spPr>
+      </p:pic>
+      <p:pic>
+        <p:nvPicPr>
+          <p:cNvPr id="5" name="Picture 4">
+            <a:extLst>
+              <a:ext uri="{FF2B5EF4-FFF2-40B4-BE49-F238E27FC236}">
+                <a16:creationId xmlns:a16="http://schemas.microsoft.com/office/drawing/2014/main" id="{2C55AB0E-E6E6-46D4-B578-6C9854B68432}"/>
+              </a:ext>
+            </a:extLst>
+          </p:cNvPr>
+          <p:cNvPicPr>
+            <a:picLocks noChangeAspect="1"/>
+          </p:cNvPicPr>
+          <p:nvPr/>
+        </p:nvPicPr>
+        <p:blipFill>
+          <a:blip r:embed="rId3"/>
+          <a:stretch>
+            <a:fillRect/>
+          </a:stretch>
+        </p:blipFill>
+        <p:spPr>
+          <a:xfrm>
+            <a:off x="6153081" y="4070014"/>
+            <a:ext cx="5611758" cy="2233510"/>
+          </a:xfrm>
+          <a:prstGeom prst="rect">
+            <a:avLst/>
+          </a:prstGeom>
+        </p:spPr>
+      </p:pic>
+      <p:pic>
+        <p:nvPicPr>
+          <p:cNvPr id="6" name="Picture 5">
+            <a:extLst>
+              <a:ext uri="{FF2B5EF4-FFF2-40B4-BE49-F238E27FC236}">
+                <a16:creationId xmlns:a16="http://schemas.microsoft.com/office/drawing/2014/main" id="{115FD15C-BB5B-4468-A5D4-22744500F4E0}"/>
+              </a:ext>
+            </a:extLst>
+          </p:cNvPr>
+          <p:cNvPicPr>
+            <a:picLocks noChangeAspect="1"/>
+          </p:cNvPicPr>
+          <p:nvPr/>
+        </p:nvPicPr>
+        <p:blipFill>
+          <a:blip r:embed="rId4"/>
+          <a:stretch>
+            <a:fillRect/>
+          </a:stretch>
+        </p:blipFill>
+        <p:spPr>
+          <a:xfrm>
+            <a:off x="6153081" y="1545185"/>
+            <a:ext cx="5611758" cy="2201889"/>
+          </a:xfrm>
+          <a:prstGeom prst="rect">
+            <a:avLst/>
+          </a:prstGeom>
+        </p:spPr>
+      </p:pic>
+      <p:sp>
+        <p:nvSpPr>
+          <p:cNvPr id="7" name="TextBox 6">
+            <a:extLst>
+              <a:ext uri="{FF2B5EF4-FFF2-40B4-BE49-F238E27FC236}">
+                <a16:creationId xmlns:a16="http://schemas.microsoft.com/office/drawing/2014/main" id="{7B5B39C5-BC7B-483B-ABBE-6EAC61712233}"/>
+              </a:ext>
+            </a:extLst>
+          </p:cNvPr>
+          <p:cNvSpPr txBox="1"/>
+          <p:nvPr/>
+        </p:nvSpPr>
+        <p:spPr>
+          <a:xfrm>
+            <a:off x="7568119" y="1118681"/>
+            <a:ext cx="2470826" cy="369332"/>
+          </a:xfrm>
+          <a:prstGeom prst="rect">
+            <a:avLst/>
+          </a:prstGeom>
+          <a:noFill/>
+        </p:spPr>
+        <p:txBody>
+          <a:bodyPr wrap="square" rtlCol="0">
+            <a:spAutoFit/>
+          </a:bodyPr>
+          <a:lstStyle/>
+          <a:p>
+            <a:r>
+              <a:rPr lang="en-CA" dirty="0"/>
+              <a:t>SGAN - Original</a:t>
+            </a:r>
+            <a:endParaRPr lang="fr-CA" dirty="0"/>
+          </a:p>
+        </p:txBody>
+      </p:sp>
+      <p:sp>
+        <p:nvSpPr>
+          <p:cNvPr id="8" name="TextBox 7">
+            <a:extLst>
+              <a:ext uri="{FF2B5EF4-FFF2-40B4-BE49-F238E27FC236}">
+                <a16:creationId xmlns:a16="http://schemas.microsoft.com/office/drawing/2014/main" id="{E7A785FF-3801-40AC-A156-74BD6E15AA29}"/>
+              </a:ext>
+            </a:extLst>
+          </p:cNvPr>
+          <p:cNvSpPr txBox="1"/>
+          <p:nvPr/>
+        </p:nvSpPr>
+        <p:spPr>
+          <a:xfrm>
+            <a:off x="7568119" y="3684967"/>
+            <a:ext cx="2470826" cy="369332"/>
+          </a:xfrm>
+          <a:prstGeom prst="rect">
+            <a:avLst/>
+          </a:prstGeom>
+          <a:noFill/>
+        </p:spPr>
+        <p:txBody>
+          <a:bodyPr wrap="square" rtlCol="0">
+            <a:spAutoFit/>
+          </a:bodyPr>
+          <a:lstStyle/>
+          <a:p>
+            <a:r>
+              <a:rPr lang="en-CA" dirty="0"/>
+              <a:t>RGAN - Experiment</a:t>
+            </a:r>
+            <a:endParaRPr lang="fr-CA" dirty="0"/>
+          </a:p>
+        </p:txBody>
+      </p:sp>
+    </p:spTree>
+    <p:extLst>
+      <p:ext uri="{BB962C8B-B14F-4D97-AF65-F5344CB8AC3E}">
+        <p14:creationId xmlns:p14="http://schemas.microsoft.com/office/powerpoint/2010/main" val="1121199222"/>
+      </p:ext>
+    </p:extLst>
+  </p:cSld>
+  <p:clrMapOvr>
+    <a:masterClrMapping/>
+  </p:clrMapOvr>
+</p:sld>
+</file>
+
+<file path=ppt/slides/slide6.xml><?xml version="1.0" encoding="utf-8"?>
+<p:sld xmlns:a="http://schemas.openxmlformats.org/drawingml/2006/main" xmlns:r="http://schemas.openxmlformats.org/officeDocument/2006/relationships" xmlns:p="http://schemas.openxmlformats.org/presentationml/2006/main">
+  <p:cSld>
+    <p:spTree>
+      <p:nvGrpSpPr>
+        <p:cNvPr id="1" name=""/>
+        <p:cNvGrpSpPr/>
+        <p:nvPr/>
+      </p:nvGrpSpPr>
+      <p:grpSpPr>
+        <a:xfrm>
+          <a:off x="0" y="0"/>
+          <a:ext cx="0" cy="0"/>
+          <a:chOff x="0" y="0"/>
+          <a:chExt cx="0" cy="0"/>
+        </a:xfrm>
+      </p:grpSpPr>
+      <p:sp>
+        <p:nvSpPr>
+          <p:cNvPr id="2" name="Title 1">
+            <a:extLst>
+              <a:ext uri="{FF2B5EF4-FFF2-40B4-BE49-F238E27FC236}">
                 <a16:creationId xmlns:a16="http://schemas.microsoft.com/office/drawing/2014/main" id="{98C17E62-DE84-4B80-A6CF-2070EDC98D21}"/>
               </a:ext>
             </a:extLst>
@@ -5980,8 +7517,8 @@
           </a:p>
         </p:txBody>
       </p:sp>
-      <mc:AlternateContent xmlns:mc="http://schemas.openxmlformats.org/markup-compatibility/2006">
-        <mc:Choice xmlns:a14="http://schemas.microsoft.com/office/drawing/2010/main" Requires="a14">
+      <mc:AlternateContent xmlns:mc="http://schemas.openxmlformats.org/markup-compatibility/2006" xmlns:a14="http://schemas.microsoft.com/office/drawing/2010/main">
+        <mc:Choice Requires="a14">
           <p:sp>
             <p:nvSpPr>
               <p:cNvPr id="3" name="Content Placeholder 2">
@@ -6585,7 +8122,7 @@
             </p:txBody>
           </p:sp>
         </mc:Choice>
-        <mc:Fallback>
+        <mc:Fallback xmlns="">
           <p:sp>
             <p:nvSpPr>
               <p:cNvPr id="3" name="Content Placeholder 2">
@@ -6642,7 +8179,7 @@
 </p:sld>
 </file>
 
-<file path=ppt/slides/slide4.xml><?xml version="1.0" encoding="utf-8"?>
+<file path=ppt/slides/slide7.xml><?xml version="1.0" encoding="utf-8"?>
 <p:sld xmlns:a="http://schemas.openxmlformats.org/drawingml/2006/main" xmlns:r="http://schemas.openxmlformats.org/officeDocument/2006/relationships" xmlns:p="http://schemas.openxmlformats.org/presentationml/2006/main">
   <p:cSld>
     <p:spTree>
@@ -6687,8 +8224,8 @@
           </a:p>
         </p:txBody>
       </p:sp>
-      <mc:AlternateContent xmlns:mc="http://schemas.openxmlformats.org/markup-compatibility/2006">
-        <mc:Choice xmlns:a14="http://schemas.microsoft.com/office/drawing/2010/main" Requires="a14">
+      <mc:AlternateContent xmlns:mc="http://schemas.openxmlformats.org/markup-compatibility/2006" xmlns:a14="http://schemas.microsoft.com/office/drawing/2010/main">
+        <mc:Choice Requires="a14">
           <p:sp>
             <p:nvSpPr>
               <p:cNvPr id="3" name="Content Placeholder 2">
@@ -6785,7 +8322,7 @@
             </p:txBody>
           </p:sp>
         </mc:Choice>
-        <mc:Fallback>
+        <mc:Fallback xmlns="">
           <p:sp>
             <p:nvSpPr>
               <p:cNvPr id="3" name="Content Placeholder 2">
@@ -7044,521 +8581,6 @@
 </p:sld>
 </file>
 
-<file path=ppt/slides/slide5.xml><?xml version="1.0" encoding="utf-8"?>
-<p:sld xmlns:a="http://schemas.openxmlformats.org/drawingml/2006/main" xmlns:r="http://schemas.openxmlformats.org/officeDocument/2006/relationships" xmlns:p="http://schemas.openxmlformats.org/presentationml/2006/main">
-  <p:cSld>
-    <p:spTree>
-      <p:nvGrpSpPr>
-        <p:cNvPr id="1" name=""/>
-        <p:cNvGrpSpPr/>
-        <p:nvPr/>
-      </p:nvGrpSpPr>
-      <p:grpSpPr>
-        <a:xfrm>
-          <a:off x="0" y="0"/>
-          <a:ext cx="0" cy="0"/>
-          <a:chOff x="0" y="0"/>
-          <a:chExt cx="0" cy="0"/>
-        </a:xfrm>
-      </p:grpSpPr>
-      <p:sp>
-        <p:nvSpPr>
-          <p:cNvPr id="2" name="Title 1">
-            <a:extLst>
-              <a:ext uri="{FF2B5EF4-FFF2-40B4-BE49-F238E27FC236}">
-                <a16:creationId xmlns:a16="http://schemas.microsoft.com/office/drawing/2014/main" id="{424E8446-FC9C-4641-9123-ECBAE4478E4B}"/>
-              </a:ext>
-            </a:extLst>
-          </p:cNvPr>
-          <p:cNvSpPr>
-            <a:spLocks noGrp="1"/>
-          </p:cNvSpPr>
-          <p:nvPr>
-            <p:ph type="title"/>
-          </p:nvPr>
-        </p:nvSpPr>
-        <p:spPr/>
-        <p:txBody>
-          <a:bodyPr/>
-          <a:lstStyle/>
-          <a:p>
-            <a:r>
-              <a:rPr lang="en-US" dirty="0"/>
-              <a:t>Using an Ensemble of Discriminators</a:t>
-            </a:r>
-          </a:p>
-        </p:txBody>
-      </p:sp>
-      <p:sp>
-        <p:nvSpPr>
-          <p:cNvPr id="3" name="Content Placeholder 2">
-            <a:extLst>
-              <a:ext uri="{FF2B5EF4-FFF2-40B4-BE49-F238E27FC236}">
-                <a16:creationId xmlns:a16="http://schemas.microsoft.com/office/drawing/2014/main" id="{E36CB50F-9445-468A-8D00-C34B1118CB5E}"/>
-              </a:ext>
-            </a:extLst>
-          </p:cNvPr>
-          <p:cNvSpPr>
-            <a:spLocks noGrp="1"/>
-          </p:cNvSpPr>
-          <p:nvPr>
-            <p:ph idx="1"/>
-          </p:nvPr>
-        </p:nvSpPr>
-        <p:spPr/>
-        <p:txBody>
-          <a:bodyPr/>
-          <a:lstStyle/>
-          <a:p>
-            <a:pPr>
-              <a:lnSpc>
-                <a:spcPct val="200000"/>
-              </a:lnSpc>
-            </a:pPr>
-            <a:r>
-              <a:rPr lang="en-US" dirty="0"/>
-              <a:t>Use multiple discriminators during the training of a single generator</a:t>
-            </a:r>
-          </a:p>
-          <a:p>
-            <a:pPr>
-              <a:lnSpc>
-                <a:spcPct val="200000"/>
-              </a:lnSpc>
-            </a:pPr>
-            <a:r>
-              <a:rPr lang="en-US" dirty="0"/>
-              <a:t>Forces generator to generalize in order to satisfy ensemble</a:t>
-            </a:r>
-          </a:p>
-          <a:p>
-            <a:pPr>
-              <a:lnSpc>
-                <a:spcPct val="200000"/>
-              </a:lnSpc>
-            </a:pPr>
-            <a:r>
-              <a:rPr lang="en-US" dirty="0"/>
-              <a:t>Makes up for weak discriminators</a:t>
-            </a:r>
-          </a:p>
-        </p:txBody>
-      </p:sp>
-    </p:spTree>
-    <p:extLst>
-      <p:ext uri="{BB962C8B-B14F-4D97-AF65-F5344CB8AC3E}">
-        <p14:creationId xmlns:p14="http://schemas.microsoft.com/office/powerpoint/2010/main" val="3776846236"/>
-      </p:ext>
-    </p:extLst>
-  </p:cSld>
-  <p:clrMapOvr>
-    <a:masterClrMapping/>
-  </p:clrMapOvr>
-</p:sld>
-</file>
-
-<file path=ppt/slides/slide6.xml><?xml version="1.0" encoding="utf-8"?>
-<p:sld xmlns:a="http://schemas.openxmlformats.org/drawingml/2006/main" xmlns:r="http://schemas.openxmlformats.org/officeDocument/2006/relationships" xmlns:p="http://schemas.openxmlformats.org/presentationml/2006/main">
-  <p:cSld>
-    <p:spTree>
-      <p:nvGrpSpPr>
-        <p:cNvPr id="1" name=""/>
-        <p:cNvGrpSpPr/>
-        <p:nvPr/>
-      </p:nvGrpSpPr>
-      <p:grpSpPr>
-        <a:xfrm>
-          <a:off x="0" y="0"/>
-          <a:ext cx="0" cy="0"/>
-          <a:chOff x="0" y="0"/>
-          <a:chExt cx="0" cy="0"/>
-        </a:xfrm>
-      </p:grpSpPr>
-      <p:sp>
-        <p:nvSpPr>
-          <p:cNvPr id="2" name="Title 1">
-            <a:extLst>
-              <a:ext uri="{FF2B5EF4-FFF2-40B4-BE49-F238E27FC236}">
-                <a16:creationId xmlns:a16="http://schemas.microsoft.com/office/drawing/2014/main" id="{3CA41162-7D0B-4E78-8A2C-07C4E401EF5A}"/>
-              </a:ext>
-            </a:extLst>
-          </p:cNvPr>
-          <p:cNvSpPr>
-            <a:spLocks noGrp="1"/>
-          </p:cNvSpPr>
-          <p:nvPr>
-            <p:ph type="title"/>
-          </p:nvPr>
-        </p:nvSpPr>
-        <p:spPr/>
-        <p:txBody>
-          <a:bodyPr/>
-          <a:lstStyle/>
-          <a:p>
-            <a:r>
-              <a:rPr lang="en-US" dirty="0"/>
-              <a:t>Using an ensemble of discriminators</a:t>
-            </a:r>
-          </a:p>
-        </p:txBody>
-      </p:sp>
-      <p:pic>
-        <p:nvPicPr>
-          <p:cNvPr id="5" name="Content Placeholder 4" descr="A picture containing text, sky&#10;&#10;Description automatically generated">
-            <a:extLst>
-              <a:ext uri="{FF2B5EF4-FFF2-40B4-BE49-F238E27FC236}">
-                <a16:creationId xmlns:a16="http://schemas.microsoft.com/office/drawing/2014/main" id="{06838293-8369-4748-AC32-933668A54590}"/>
-              </a:ext>
-            </a:extLst>
-          </p:cNvPr>
-          <p:cNvPicPr>
-            <a:picLocks noGrp="1" noChangeAspect="1"/>
-          </p:cNvPicPr>
-          <p:nvPr>
-            <p:ph idx="1"/>
-          </p:nvPr>
-        </p:nvPicPr>
-        <p:blipFill>
-          <a:blip r:embed="rId2"/>
-          <a:stretch>
-            <a:fillRect/>
-          </a:stretch>
-        </p:blipFill>
-        <p:spPr>
-          <a:xfrm>
-            <a:off x="685800" y="1821358"/>
-            <a:ext cx="10131425" cy="4427042"/>
-          </a:xfrm>
-        </p:spPr>
-      </p:pic>
-    </p:spTree>
-    <p:extLst>
-      <p:ext uri="{BB962C8B-B14F-4D97-AF65-F5344CB8AC3E}">
-        <p14:creationId xmlns:p14="http://schemas.microsoft.com/office/powerpoint/2010/main" val="3934748566"/>
-      </p:ext>
-    </p:extLst>
-  </p:cSld>
-  <p:clrMapOvr>
-    <a:masterClrMapping/>
-  </p:clrMapOvr>
-</p:sld>
-</file>
-
-<file path=ppt/slides/slide7.xml><?xml version="1.0" encoding="utf-8"?>
-<p:sld xmlns:a="http://schemas.openxmlformats.org/drawingml/2006/main" xmlns:r="http://schemas.openxmlformats.org/officeDocument/2006/relationships" xmlns:p="http://schemas.openxmlformats.org/presentationml/2006/main">
-  <p:cSld>
-    <p:spTree>
-      <p:nvGrpSpPr>
-        <p:cNvPr id="1" name=""/>
-        <p:cNvGrpSpPr/>
-        <p:nvPr/>
-      </p:nvGrpSpPr>
-      <p:grpSpPr>
-        <a:xfrm>
-          <a:off x="0" y="0"/>
-          <a:ext cx="0" cy="0"/>
-          <a:chOff x="0" y="0"/>
-          <a:chExt cx="0" cy="0"/>
-        </a:xfrm>
-      </p:grpSpPr>
-      <p:sp>
-        <p:nvSpPr>
-          <p:cNvPr id="2" name="Title 1">
-            <a:extLst>
-              <a:ext uri="{FF2B5EF4-FFF2-40B4-BE49-F238E27FC236}">
-                <a16:creationId xmlns:a16="http://schemas.microsoft.com/office/drawing/2014/main" id="{D7EBE005-9015-4481-8CC1-A55EC42446DB}"/>
-              </a:ext>
-            </a:extLst>
-          </p:cNvPr>
-          <p:cNvSpPr>
-            <a:spLocks noGrp="1"/>
-          </p:cNvSpPr>
-          <p:nvPr>
-            <p:ph type="title"/>
-          </p:nvPr>
-        </p:nvSpPr>
-        <p:spPr/>
-        <p:txBody>
-          <a:bodyPr/>
-          <a:lstStyle/>
-          <a:p>
-            <a:r>
-              <a:rPr lang="en-US" dirty="0"/>
-              <a:t>Using an Ensemble of Discriminators</a:t>
-            </a:r>
-          </a:p>
-        </p:txBody>
-      </p:sp>
-      <p:sp>
-        <p:nvSpPr>
-          <p:cNvPr id="3" name="Content Placeholder 2">
-            <a:extLst>
-              <a:ext uri="{FF2B5EF4-FFF2-40B4-BE49-F238E27FC236}">
-                <a16:creationId xmlns:a16="http://schemas.microsoft.com/office/drawing/2014/main" id="{D2F916F7-28A7-46EB-9D5F-4AB8F5B5BAED}"/>
-              </a:ext>
-            </a:extLst>
-          </p:cNvPr>
-          <p:cNvSpPr>
-            <a:spLocks noGrp="1"/>
-          </p:cNvSpPr>
-          <p:nvPr>
-            <p:ph idx="1"/>
-          </p:nvPr>
-        </p:nvSpPr>
-        <p:spPr>
-          <a:xfrm>
-            <a:off x="489859" y="1839946"/>
-            <a:ext cx="10131425" cy="1015222"/>
-          </a:xfrm>
-        </p:spPr>
-        <p:txBody>
-          <a:bodyPr>
-            <a:normAutofit fontScale="92500" lnSpcReduction="20000"/>
-          </a:bodyPr>
-          <a:lstStyle/>
-          <a:p>
-            <a:r>
-              <a:rPr lang="en-US" dirty="0"/>
-              <a:t>Trained two </a:t>
-            </a:r>
-            <a:r>
-              <a:rPr lang="en-US" dirty="0" err="1"/>
-              <a:t>CycleGANs</a:t>
-            </a:r>
-            <a:r>
-              <a:rPr lang="en-US" dirty="0"/>
-              <a:t>, A and B, in same way as paper</a:t>
-            </a:r>
-          </a:p>
-          <a:p>
-            <a:r>
-              <a:rPr lang="en-US" dirty="0"/>
-              <a:t>Used smaller generators and stronger preprocessing for faster training time.</a:t>
-            </a:r>
-          </a:p>
-          <a:p>
-            <a:r>
-              <a:rPr lang="en-US" dirty="0"/>
-              <a:t>Fine tuned generators from set A with an extra 20 epochs on discriminators from set B</a:t>
-            </a:r>
-          </a:p>
-        </p:txBody>
-      </p:sp>
-      <p:pic>
-        <p:nvPicPr>
-          <p:cNvPr id="5" name="Picture 4">
-            <a:extLst>
-              <a:ext uri="{FF2B5EF4-FFF2-40B4-BE49-F238E27FC236}">
-                <a16:creationId xmlns:a16="http://schemas.microsoft.com/office/drawing/2014/main" id="{1CD43925-4761-4419-ADD2-F032C5A1C1A0}"/>
-              </a:ext>
-            </a:extLst>
-          </p:cNvPr>
-          <p:cNvPicPr>
-            <a:picLocks noChangeAspect="1"/>
-          </p:cNvPicPr>
-          <p:nvPr/>
-        </p:nvPicPr>
-        <p:blipFill>
-          <a:blip r:embed="rId2"/>
-          <a:stretch>
-            <a:fillRect/>
-          </a:stretch>
-        </p:blipFill>
-        <p:spPr>
-          <a:xfrm>
-            <a:off x="2033551" y="4085514"/>
-            <a:ext cx="2228585" cy="2194560"/>
-          </a:xfrm>
-          <a:prstGeom prst="rect">
-            <a:avLst/>
-          </a:prstGeom>
-        </p:spPr>
-      </p:pic>
-      <p:pic>
-        <p:nvPicPr>
-          <p:cNvPr id="7" name="Picture 6">
-            <a:extLst>
-              <a:ext uri="{FF2B5EF4-FFF2-40B4-BE49-F238E27FC236}">
-                <a16:creationId xmlns:a16="http://schemas.microsoft.com/office/drawing/2014/main" id="{1B8E8D28-56A1-4C2A-923E-1DF9B039DE59}"/>
-              </a:ext>
-            </a:extLst>
-          </p:cNvPr>
-          <p:cNvPicPr>
-            <a:picLocks noChangeAspect="1"/>
-          </p:cNvPicPr>
-          <p:nvPr/>
-        </p:nvPicPr>
-        <p:blipFill>
-          <a:blip r:embed="rId3"/>
-          <a:stretch>
-            <a:fillRect/>
-          </a:stretch>
-        </p:blipFill>
-        <p:spPr>
-          <a:xfrm>
-            <a:off x="4964564" y="4085514"/>
-            <a:ext cx="2262872" cy="2194560"/>
-          </a:xfrm>
-          <a:prstGeom prst="rect">
-            <a:avLst/>
-          </a:prstGeom>
-        </p:spPr>
-      </p:pic>
-      <p:pic>
-        <p:nvPicPr>
-          <p:cNvPr id="9" name="Picture 8">
-            <a:extLst>
-              <a:ext uri="{FF2B5EF4-FFF2-40B4-BE49-F238E27FC236}">
-                <a16:creationId xmlns:a16="http://schemas.microsoft.com/office/drawing/2014/main" id="{CD9FEF2F-801A-4EEA-8A3A-77B4F61A8FD6}"/>
-              </a:ext>
-            </a:extLst>
-          </p:cNvPr>
-          <p:cNvPicPr>
-            <a:picLocks noChangeAspect="1"/>
-          </p:cNvPicPr>
-          <p:nvPr/>
-        </p:nvPicPr>
-        <p:blipFill>
-          <a:blip r:embed="rId4"/>
-          <a:stretch>
-            <a:fillRect/>
-          </a:stretch>
-        </p:blipFill>
-        <p:spPr>
-          <a:xfrm>
-            <a:off x="7938371" y="4085514"/>
-            <a:ext cx="2220078" cy="2194560"/>
-          </a:xfrm>
-          <a:prstGeom prst="rect">
-            <a:avLst/>
-          </a:prstGeom>
-        </p:spPr>
-      </p:pic>
-      <p:sp>
-        <p:nvSpPr>
-          <p:cNvPr id="10" name="TextBox 9">
-            <a:extLst>
-              <a:ext uri="{FF2B5EF4-FFF2-40B4-BE49-F238E27FC236}">
-                <a16:creationId xmlns:a16="http://schemas.microsoft.com/office/drawing/2014/main" id="{82C671C8-85C4-4C6E-BD69-CC094C1665AE}"/>
-              </a:ext>
-            </a:extLst>
-          </p:cNvPr>
-          <p:cNvSpPr txBox="1"/>
-          <p:nvPr/>
-        </p:nvSpPr>
-        <p:spPr>
-          <a:xfrm>
-            <a:off x="2375195" y="3463290"/>
-            <a:ext cx="1545295" cy="369332"/>
-          </a:xfrm>
-          <a:prstGeom prst="rect">
-            <a:avLst/>
-          </a:prstGeom>
-          <a:noFill/>
-        </p:spPr>
-        <p:txBody>
-          <a:bodyPr wrap="none" rtlCol="0">
-            <a:spAutoFit/>
-          </a:bodyPr>
-          <a:lstStyle/>
-          <a:p>
-            <a:r>
-              <a:rPr lang="en-US" dirty="0"/>
-              <a:t>Original Image</a:t>
-            </a:r>
-          </a:p>
-        </p:txBody>
-      </p:sp>
-      <p:sp>
-        <p:nvSpPr>
-          <p:cNvPr id="11" name="TextBox 10">
-            <a:extLst>
-              <a:ext uri="{FF2B5EF4-FFF2-40B4-BE49-F238E27FC236}">
-                <a16:creationId xmlns:a16="http://schemas.microsoft.com/office/drawing/2014/main" id="{C3827E02-2957-4310-863D-69F7B0CBCC04}"/>
-              </a:ext>
-            </a:extLst>
-          </p:cNvPr>
-          <p:cNvSpPr txBox="1"/>
-          <p:nvPr/>
-        </p:nvSpPr>
-        <p:spPr>
-          <a:xfrm>
-            <a:off x="5238040" y="3429000"/>
-            <a:ext cx="1715919" cy="369332"/>
-          </a:xfrm>
-          <a:prstGeom prst="rect">
-            <a:avLst/>
-          </a:prstGeom>
-          <a:noFill/>
-        </p:spPr>
-        <p:txBody>
-          <a:bodyPr wrap="none" rtlCol="0">
-            <a:spAutoFit/>
-          </a:bodyPr>
-          <a:lstStyle/>
-          <a:p>
-            <a:r>
-              <a:rPr lang="en-US" dirty="0"/>
-              <a:t>Zhu et al. (2020)</a:t>
-            </a:r>
-          </a:p>
-        </p:txBody>
-      </p:sp>
-      <p:sp>
-        <p:nvSpPr>
-          <p:cNvPr id="12" name="TextBox 11">
-            <a:extLst>
-              <a:ext uri="{FF2B5EF4-FFF2-40B4-BE49-F238E27FC236}">
-                <a16:creationId xmlns:a16="http://schemas.microsoft.com/office/drawing/2014/main" id="{C0D033EF-2604-4D40-8393-42FE537C2E0D}"/>
-              </a:ext>
-            </a:extLst>
-          </p:cNvPr>
-          <p:cNvSpPr txBox="1"/>
-          <p:nvPr/>
-        </p:nvSpPr>
-        <p:spPr>
-          <a:xfrm>
-            <a:off x="8034542" y="3356502"/>
-            <a:ext cx="2027735" cy="646331"/>
-          </a:xfrm>
-          <a:prstGeom prst="rect">
-            <a:avLst/>
-          </a:prstGeom>
-          <a:noFill/>
-        </p:spPr>
-        <p:txBody>
-          <a:bodyPr wrap="none" rtlCol="0">
-            <a:spAutoFit/>
-          </a:bodyPr>
-          <a:lstStyle/>
-          <a:p>
-            <a:r>
-              <a:rPr lang="en-US" dirty="0"/>
-              <a:t>With Regularization</a:t>
-            </a:r>
-          </a:p>
-          <a:p>
-            <a:pPr algn="ctr"/>
-            <a:r>
-              <a:rPr lang="en-US" dirty="0"/>
-              <a:t> Schedule</a:t>
-            </a:r>
-          </a:p>
-        </p:txBody>
-      </p:sp>
-    </p:spTree>
-    <p:extLst>
-      <p:ext uri="{BB962C8B-B14F-4D97-AF65-F5344CB8AC3E}">
-        <p14:creationId xmlns:p14="http://schemas.microsoft.com/office/powerpoint/2010/main" val="658575904"/>
-      </p:ext>
-    </p:extLst>
-  </p:cSld>
-  <p:clrMapOvr>
-    <a:masterClrMapping/>
-  </p:clrMapOvr>
-</p:sld>
-</file>
-
 <file path=ppt/slides/slide8.xml><?xml version="1.0" encoding="utf-8"?>
 <p:sld xmlns:a="http://schemas.openxmlformats.org/drawingml/2006/main" xmlns:r="http://schemas.openxmlformats.org/officeDocument/2006/relationships" xmlns:p="http://schemas.openxmlformats.org/presentationml/2006/main">
   <p:cSld>
@@ -7576,19 +8598,162 @@
           <a:chExt cx="0" cy="0"/>
         </a:xfrm>
       </p:grpSpPr>
+      <p:sp>
+        <p:nvSpPr>
+          <p:cNvPr id="2" name="Title 1">
+            <a:extLst>
+              <a:ext uri="{FF2B5EF4-FFF2-40B4-BE49-F238E27FC236}">
+                <a16:creationId xmlns:a16="http://schemas.microsoft.com/office/drawing/2014/main" id="{424E8446-FC9C-4641-9123-ECBAE4478E4B}"/>
+              </a:ext>
+            </a:extLst>
+          </p:cNvPr>
+          <p:cNvSpPr>
+            <a:spLocks noGrp="1"/>
+          </p:cNvSpPr>
+          <p:nvPr>
+            <p:ph type="title"/>
+          </p:nvPr>
+        </p:nvSpPr>
+        <p:spPr/>
+        <p:txBody>
+          <a:bodyPr/>
+          <a:lstStyle/>
+          <a:p>
+            <a:r>
+              <a:rPr lang="en-US" dirty="0"/>
+              <a:t>Using an Ensemble of Discriminators</a:t>
+            </a:r>
+          </a:p>
+        </p:txBody>
+      </p:sp>
+      <p:sp>
+        <p:nvSpPr>
+          <p:cNvPr id="3" name="Content Placeholder 2">
+            <a:extLst>
+              <a:ext uri="{FF2B5EF4-FFF2-40B4-BE49-F238E27FC236}">
+                <a16:creationId xmlns:a16="http://schemas.microsoft.com/office/drawing/2014/main" id="{E36CB50F-9445-468A-8D00-C34B1118CB5E}"/>
+              </a:ext>
+            </a:extLst>
+          </p:cNvPr>
+          <p:cNvSpPr>
+            <a:spLocks noGrp="1"/>
+          </p:cNvSpPr>
+          <p:nvPr>
+            <p:ph idx="1"/>
+          </p:nvPr>
+        </p:nvSpPr>
+        <p:spPr/>
+        <p:txBody>
+          <a:bodyPr/>
+          <a:lstStyle/>
+          <a:p>
+            <a:pPr>
+              <a:lnSpc>
+                <a:spcPct val="200000"/>
+              </a:lnSpc>
+            </a:pPr>
+            <a:r>
+              <a:rPr lang="en-US" dirty="0"/>
+              <a:t>Use multiple discriminators during the training of a single generator</a:t>
+            </a:r>
+          </a:p>
+          <a:p>
+            <a:pPr>
+              <a:lnSpc>
+                <a:spcPct val="200000"/>
+              </a:lnSpc>
+            </a:pPr>
+            <a:r>
+              <a:rPr lang="en-US" dirty="0"/>
+              <a:t>Forces generator to generalize in order to satisfy ensemble</a:t>
+            </a:r>
+          </a:p>
+          <a:p>
+            <a:pPr>
+              <a:lnSpc>
+                <a:spcPct val="200000"/>
+              </a:lnSpc>
+            </a:pPr>
+            <a:r>
+              <a:rPr lang="en-US" dirty="0"/>
+              <a:t>Makes up for weak discriminators</a:t>
+            </a:r>
+          </a:p>
+        </p:txBody>
+      </p:sp>
+    </p:spTree>
+    <p:extLst>
+      <p:ext uri="{BB962C8B-B14F-4D97-AF65-F5344CB8AC3E}">
+        <p14:creationId xmlns:p14="http://schemas.microsoft.com/office/powerpoint/2010/main" val="3776846236"/>
+      </p:ext>
+    </p:extLst>
+  </p:cSld>
+  <p:clrMapOvr>
+    <a:masterClrMapping/>
+  </p:clrMapOvr>
+</p:sld>
+</file>
+
+<file path=ppt/slides/slide9.xml><?xml version="1.0" encoding="utf-8"?>
+<p:sld xmlns:a="http://schemas.openxmlformats.org/drawingml/2006/main" xmlns:r="http://schemas.openxmlformats.org/officeDocument/2006/relationships" xmlns:p="http://schemas.openxmlformats.org/presentationml/2006/main">
+  <p:cSld>
+    <p:spTree>
+      <p:nvGrpSpPr>
+        <p:cNvPr id="1" name=""/>
+        <p:cNvGrpSpPr/>
+        <p:nvPr/>
+      </p:nvGrpSpPr>
+      <p:grpSpPr>
+        <a:xfrm>
+          <a:off x="0" y="0"/>
+          <a:ext cx="0" cy="0"/>
+          <a:chOff x="0" y="0"/>
+          <a:chExt cx="0" cy="0"/>
+        </a:xfrm>
+      </p:grpSpPr>
+      <p:sp>
+        <p:nvSpPr>
+          <p:cNvPr id="2" name="Title 1">
+            <a:extLst>
+              <a:ext uri="{FF2B5EF4-FFF2-40B4-BE49-F238E27FC236}">
+                <a16:creationId xmlns:a16="http://schemas.microsoft.com/office/drawing/2014/main" id="{3CA41162-7D0B-4E78-8A2C-07C4E401EF5A}"/>
+              </a:ext>
+            </a:extLst>
+          </p:cNvPr>
+          <p:cNvSpPr>
+            <a:spLocks noGrp="1"/>
+          </p:cNvSpPr>
+          <p:nvPr>
+            <p:ph type="title"/>
+          </p:nvPr>
+        </p:nvSpPr>
+        <p:spPr/>
+        <p:txBody>
+          <a:bodyPr/>
+          <a:lstStyle/>
+          <a:p>
+            <a:r>
+              <a:rPr lang="en-US" dirty="0"/>
+              <a:t>Using an ensemble of discriminators</a:t>
+            </a:r>
+          </a:p>
+        </p:txBody>
+      </p:sp>
       <p:pic>
         <p:nvPicPr>
-          <p:cNvPr id="5" name="Picture 4" descr="A picture containing grass, outdoor, horse, mammal&#10;&#10;Description automatically generated">
+          <p:cNvPr id="5" name="Content Placeholder 4" descr="A picture containing text, sky&#10;&#10;Description automatically generated">
             <a:extLst>
               <a:ext uri="{FF2B5EF4-FFF2-40B4-BE49-F238E27FC236}">
-                <a16:creationId xmlns:a16="http://schemas.microsoft.com/office/drawing/2014/main" id="{69FBA210-2B69-45FC-B023-951857BF335D}"/>
+                <a16:creationId xmlns:a16="http://schemas.microsoft.com/office/drawing/2014/main" id="{06838293-8369-4748-AC32-933668A54590}"/>
               </a:ext>
             </a:extLst>
           </p:cNvPr>
           <p:cNvPicPr>
-            <a:picLocks noChangeAspect="1"/>
+            <a:picLocks noGrp="1" noChangeAspect="1"/>
           </p:cNvPicPr>
-          <p:nvPr/>
+          <p:nvPr>
+            <p:ph idx="1"/>
+          </p:nvPr>
         </p:nvPicPr>
         <p:blipFill>
           <a:blip r:embed="rId2"/>
@@ -7598,634 +8763,15 @@
         </p:blipFill>
         <p:spPr>
           <a:xfrm>
-            <a:off x="2717995" y="648998"/>
-            <a:ext cx="1578674" cy="1554480"/>
-          </a:xfrm>
-          <a:prstGeom prst="rect">
-            <a:avLst/>
-          </a:prstGeom>
-        </p:spPr>
-      </p:pic>
-      <p:pic>
-        <p:nvPicPr>
-          <p:cNvPr id="7" name="Picture 6">
-            <a:extLst>
-              <a:ext uri="{FF2B5EF4-FFF2-40B4-BE49-F238E27FC236}">
-                <a16:creationId xmlns:a16="http://schemas.microsoft.com/office/drawing/2014/main" id="{F10D2599-4710-4CEC-BEA7-108DAE43BD3B}"/>
-              </a:ext>
-            </a:extLst>
-          </p:cNvPr>
-          <p:cNvPicPr>
-            <a:picLocks noChangeAspect="1"/>
-          </p:cNvPicPr>
-          <p:nvPr/>
-        </p:nvPicPr>
-        <p:blipFill>
-          <a:blip r:embed="rId3"/>
-          <a:stretch>
-            <a:fillRect/>
-          </a:stretch>
-        </p:blipFill>
-        <p:spPr>
-          <a:xfrm>
-            <a:off x="7312874" y="650953"/>
-            <a:ext cx="1578580" cy="1554480"/>
-          </a:xfrm>
-          <a:prstGeom prst="rect">
-            <a:avLst/>
-          </a:prstGeom>
-        </p:spPr>
-      </p:pic>
-      <p:pic>
-        <p:nvPicPr>
-          <p:cNvPr id="9" name="Picture 8">
-            <a:extLst>
-              <a:ext uri="{FF2B5EF4-FFF2-40B4-BE49-F238E27FC236}">
-                <a16:creationId xmlns:a16="http://schemas.microsoft.com/office/drawing/2014/main" id="{CFE72F35-3D6A-4769-8A80-28BD90D87220}"/>
-              </a:ext>
-            </a:extLst>
-          </p:cNvPr>
-          <p:cNvPicPr>
-            <a:picLocks noChangeAspect="1"/>
-          </p:cNvPicPr>
-          <p:nvPr/>
-        </p:nvPicPr>
-        <p:blipFill>
-          <a:blip r:embed="rId4"/>
-          <a:stretch>
-            <a:fillRect/>
-          </a:stretch>
-        </p:blipFill>
-        <p:spPr>
-          <a:xfrm>
-            <a:off x="4246901" y="651155"/>
-            <a:ext cx="1566767" cy="1554480"/>
-          </a:xfrm>
-          <a:prstGeom prst="rect">
-            <a:avLst/>
-          </a:prstGeom>
-        </p:spPr>
-      </p:pic>
-      <p:pic>
-        <p:nvPicPr>
-          <p:cNvPr id="11" name="Picture 10">
-            <a:extLst>
-              <a:ext uri="{FF2B5EF4-FFF2-40B4-BE49-F238E27FC236}">
-                <a16:creationId xmlns:a16="http://schemas.microsoft.com/office/drawing/2014/main" id="{24E52737-1C86-402E-8E68-55C82D4973C9}"/>
-              </a:ext>
-            </a:extLst>
-          </p:cNvPr>
-          <p:cNvPicPr>
-            <a:picLocks noChangeAspect="1"/>
-          </p:cNvPicPr>
-          <p:nvPr/>
-        </p:nvPicPr>
-        <p:blipFill>
-          <a:blip r:embed="rId5"/>
-          <a:stretch>
-            <a:fillRect/>
-          </a:stretch>
-        </p:blipFill>
-        <p:spPr>
-          <a:xfrm>
-            <a:off x="2730847" y="5301363"/>
-            <a:ext cx="1537706" cy="1554480"/>
-          </a:xfrm>
-          <a:prstGeom prst="rect">
-            <a:avLst/>
-          </a:prstGeom>
-        </p:spPr>
-      </p:pic>
-      <p:pic>
-        <p:nvPicPr>
-          <p:cNvPr id="13" name="Picture 12" descr="A picture containing grass, outdoor, standing, mammal&#10;&#10;Description automatically generated">
-            <a:extLst>
-              <a:ext uri="{FF2B5EF4-FFF2-40B4-BE49-F238E27FC236}">
-                <a16:creationId xmlns:a16="http://schemas.microsoft.com/office/drawing/2014/main" id="{27506948-82C7-45A9-8F71-C16402BDED6A}"/>
-              </a:ext>
-            </a:extLst>
-          </p:cNvPr>
-          <p:cNvPicPr>
-            <a:picLocks noChangeAspect="1"/>
-          </p:cNvPicPr>
-          <p:nvPr/>
-        </p:nvPicPr>
-        <p:blipFill>
-          <a:blip r:embed="rId6"/>
-          <a:stretch>
-            <a:fillRect/>
-          </a:stretch>
-        </p:blipFill>
-        <p:spPr>
-          <a:xfrm>
-            <a:off x="7328022" y="5290076"/>
-            <a:ext cx="1596987" cy="1554480"/>
-          </a:xfrm>
-          <a:prstGeom prst="rect">
-            <a:avLst/>
-          </a:prstGeom>
-        </p:spPr>
-      </p:pic>
-      <p:pic>
-        <p:nvPicPr>
-          <p:cNvPr id="15" name="Picture 14">
-            <a:extLst>
-              <a:ext uri="{FF2B5EF4-FFF2-40B4-BE49-F238E27FC236}">
-                <a16:creationId xmlns:a16="http://schemas.microsoft.com/office/drawing/2014/main" id="{7BBEF5F5-387E-404E-B587-BCC436EB22B7}"/>
-              </a:ext>
-            </a:extLst>
-          </p:cNvPr>
-          <p:cNvPicPr>
-            <a:picLocks noChangeAspect="1"/>
-          </p:cNvPicPr>
-          <p:nvPr/>
-        </p:nvPicPr>
-        <p:blipFill>
-          <a:blip r:embed="rId7"/>
-          <a:stretch>
-            <a:fillRect/>
-          </a:stretch>
-        </p:blipFill>
-        <p:spPr>
-          <a:xfrm>
-            <a:off x="4259926" y="5303520"/>
-            <a:ext cx="1515339" cy="1554480"/>
-          </a:xfrm>
-          <a:prstGeom prst="rect">
-            <a:avLst/>
-          </a:prstGeom>
-        </p:spPr>
-      </p:pic>
-      <p:pic>
-        <p:nvPicPr>
-          <p:cNvPr id="17" name="Picture 16">
-            <a:extLst>
-              <a:ext uri="{FF2B5EF4-FFF2-40B4-BE49-F238E27FC236}">
-                <a16:creationId xmlns:a16="http://schemas.microsoft.com/office/drawing/2014/main" id="{83DDE3AD-DED5-41EC-909F-112C3A7234BA}"/>
-              </a:ext>
-            </a:extLst>
-          </p:cNvPr>
-          <p:cNvPicPr>
-            <a:picLocks noChangeAspect="1"/>
-          </p:cNvPicPr>
-          <p:nvPr/>
-        </p:nvPicPr>
-        <p:blipFill>
-          <a:blip r:embed="rId8"/>
-          <a:stretch>
-            <a:fillRect/>
-          </a:stretch>
-        </p:blipFill>
-        <p:spPr>
-          <a:xfrm>
-            <a:off x="2721017" y="2203478"/>
-            <a:ext cx="1572629" cy="1554480"/>
-          </a:xfrm>
-          <a:prstGeom prst="rect">
-            <a:avLst/>
-          </a:prstGeom>
-        </p:spPr>
-      </p:pic>
-      <p:pic>
-        <p:nvPicPr>
-          <p:cNvPr id="19" name="Picture 18">
-            <a:extLst>
-              <a:ext uri="{FF2B5EF4-FFF2-40B4-BE49-F238E27FC236}">
-                <a16:creationId xmlns:a16="http://schemas.microsoft.com/office/drawing/2014/main" id="{E9E375C5-F7D7-46EB-AC1E-0C4C7F6CADD0}"/>
-              </a:ext>
-            </a:extLst>
-          </p:cNvPr>
-          <p:cNvPicPr>
-            <a:picLocks noChangeAspect="1"/>
-          </p:cNvPicPr>
-          <p:nvPr/>
-        </p:nvPicPr>
-        <p:blipFill>
-          <a:blip r:embed="rId9"/>
-          <a:stretch>
-            <a:fillRect/>
-          </a:stretch>
-        </p:blipFill>
-        <p:spPr>
-          <a:xfrm>
-            <a:off x="5789859" y="2196122"/>
-            <a:ext cx="1578580" cy="1554480"/>
-          </a:xfrm>
-          <a:prstGeom prst="rect">
-            <a:avLst/>
-          </a:prstGeom>
-        </p:spPr>
-      </p:pic>
-      <p:pic>
-        <p:nvPicPr>
-          <p:cNvPr id="21" name="Picture 20">
-            <a:extLst>
-              <a:ext uri="{FF2B5EF4-FFF2-40B4-BE49-F238E27FC236}">
-                <a16:creationId xmlns:a16="http://schemas.microsoft.com/office/drawing/2014/main" id="{E4D2C3FD-76B5-409A-8F71-D5191F1BF02E}"/>
-              </a:ext>
-            </a:extLst>
-          </p:cNvPr>
-          <p:cNvPicPr>
-            <a:picLocks noChangeAspect="1"/>
-          </p:cNvPicPr>
-          <p:nvPr/>
-        </p:nvPicPr>
-        <p:blipFill>
-          <a:blip r:embed="rId10"/>
-          <a:stretch>
-            <a:fillRect/>
-          </a:stretch>
-        </p:blipFill>
-        <p:spPr>
-          <a:xfrm>
-            <a:off x="4249049" y="2205635"/>
-            <a:ext cx="1572697" cy="1554480"/>
-          </a:xfrm>
-          <a:prstGeom prst="rect">
-            <a:avLst/>
-          </a:prstGeom>
-        </p:spPr>
-      </p:pic>
-      <p:pic>
-        <p:nvPicPr>
-          <p:cNvPr id="23" name="Picture 22">
-            <a:extLst>
-              <a:ext uri="{FF2B5EF4-FFF2-40B4-BE49-F238E27FC236}">
-                <a16:creationId xmlns:a16="http://schemas.microsoft.com/office/drawing/2014/main" id="{4BFF9740-1FDB-4BDC-955E-CC428D5185A6}"/>
-              </a:ext>
-            </a:extLst>
-          </p:cNvPr>
-          <p:cNvPicPr>
-            <a:picLocks noChangeAspect="1"/>
-          </p:cNvPicPr>
-          <p:nvPr/>
-        </p:nvPicPr>
-        <p:blipFill>
-          <a:blip r:embed="rId11"/>
-          <a:stretch>
-            <a:fillRect/>
-          </a:stretch>
-        </p:blipFill>
-        <p:spPr>
-          <a:xfrm>
-            <a:off x="2727628" y="3755801"/>
-            <a:ext cx="1578581" cy="1554480"/>
-          </a:xfrm>
-          <a:prstGeom prst="rect">
-            <a:avLst/>
-          </a:prstGeom>
-        </p:spPr>
-      </p:pic>
-      <p:pic>
-        <p:nvPicPr>
-          <p:cNvPr id="27" name="Picture 26">
-            <a:extLst>
-              <a:ext uri="{FF2B5EF4-FFF2-40B4-BE49-F238E27FC236}">
-                <a16:creationId xmlns:a16="http://schemas.microsoft.com/office/drawing/2014/main" id="{73D7EE0F-FD96-4AF7-90D6-056888B368D3}"/>
-              </a:ext>
-            </a:extLst>
-          </p:cNvPr>
-          <p:cNvPicPr>
-            <a:picLocks noChangeAspect="1"/>
-          </p:cNvPicPr>
-          <p:nvPr/>
-        </p:nvPicPr>
-        <p:blipFill>
-          <a:blip r:embed="rId12"/>
-          <a:stretch>
-            <a:fillRect/>
-          </a:stretch>
-        </p:blipFill>
-        <p:spPr>
-          <a:xfrm>
-            <a:off x="4234990" y="3757958"/>
-            <a:ext cx="1602868" cy="1554480"/>
-          </a:xfrm>
-          <a:prstGeom prst="rect">
-            <a:avLst/>
-          </a:prstGeom>
-        </p:spPr>
-      </p:pic>
-      <p:pic>
-        <p:nvPicPr>
-          <p:cNvPr id="29" name="Picture 28">
-            <a:extLst>
-              <a:ext uri="{FF2B5EF4-FFF2-40B4-BE49-F238E27FC236}">
-                <a16:creationId xmlns:a16="http://schemas.microsoft.com/office/drawing/2014/main" id="{A27B7FF6-944C-449F-97D6-0E09402E1DAA}"/>
-              </a:ext>
-            </a:extLst>
-          </p:cNvPr>
-          <p:cNvPicPr>
-            <a:picLocks noChangeAspect="1"/>
-          </p:cNvPicPr>
-          <p:nvPr/>
-        </p:nvPicPr>
-        <p:blipFill>
-          <a:blip r:embed="rId13"/>
-          <a:stretch>
-            <a:fillRect/>
-          </a:stretch>
-        </p:blipFill>
-        <p:spPr>
-          <a:xfrm>
-            <a:off x="5789859" y="641642"/>
-            <a:ext cx="1572555" cy="1554480"/>
-          </a:xfrm>
-          <a:prstGeom prst="rect">
-            <a:avLst/>
-          </a:prstGeom>
-        </p:spPr>
-      </p:pic>
-      <p:pic>
-        <p:nvPicPr>
-          <p:cNvPr id="31" name="Picture 30">
-            <a:extLst>
-              <a:ext uri="{FF2B5EF4-FFF2-40B4-BE49-F238E27FC236}">
-                <a16:creationId xmlns:a16="http://schemas.microsoft.com/office/drawing/2014/main" id="{6126E356-5B23-4E19-87DD-E5C5B5D2BCBF}"/>
-              </a:ext>
-            </a:extLst>
-          </p:cNvPr>
-          <p:cNvPicPr>
-            <a:picLocks noChangeAspect="1"/>
-          </p:cNvPicPr>
-          <p:nvPr/>
-        </p:nvPicPr>
-        <p:blipFill>
-          <a:blip r:embed="rId14"/>
-          <a:stretch>
-            <a:fillRect/>
-          </a:stretch>
-        </p:blipFill>
-        <p:spPr>
-          <a:xfrm>
-            <a:off x="5783810" y="5301363"/>
-            <a:ext cx="1572556" cy="1554480"/>
-          </a:xfrm>
-          <a:prstGeom prst="rect">
-            <a:avLst/>
-          </a:prstGeom>
-        </p:spPr>
-      </p:pic>
-      <p:pic>
-        <p:nvPicPr>
-          <p:cNvPr id="33" name="Picture 32">
-            <a:extLst>
-              <a:ext uri="{FF2B5EF4-FFF2-40B4-BE49-F238E27FC236}">
-                <a16:creationId xmlns:a16="http://schemas.microsoft.com/office/drawing/2014/main" id="{6AB4BE9E-F7C7-4D91-AEBC-3D9FF3125CB3}"/>
-              </a:ext>
-            </a:extLst>
-          </p:cNvPr>
-          <p:cNvPicPr>
-            <a:picLocks noChangeAspect="1"/>
-          </p:cNvPicPr>
-          <p:nvPr/>
-        </p:nvPicPr>
-        <p:blipFill>
-          <a:blip r:embed="rId15"/>
-          <a:stretch>
-            <a:fillRect/>
-          </a:stretch>
-        </p:blipFill>
-        <p:spPr>
-          <a:xfrm>
-            <a:off x="7356366" y="2222100"/>
-            <a:ext cx="1513571" cy="1554480"/>
-          </a:xfrm>
-          <a:prstGeom prst="rect">
-            <a:avLst/>
-          </a:prstGeom>
-        </p:spPr>
-      </p:pic>
-      <p:sp>
-        <p:nvSpPr>
-          <p:cNvPr id="36" name="TextBox 35">
-            <a:extLst>
-              <a:ext uri="{FF2B5EF4-FFF2-40B4-BE49-F238E27FC236}">
-                <a16:creationId xmlns:a16="http://schemas.microsoft.com/office/drawing/2014/main" id="{D4124411-F0E9-4240-A345-175C1D73177A}"/>
-              </a:ext>
-            </a:extLst>
-          </p:cNvPr>
-          <p:cNvSpPr txBox="1"/>
-          <p:nvPr/>
-        </p:nvSpPr>
-        <p:spPr>
-          <a:xfrm>
-            <a:off x="2723258" y="165178"/>
-            <a:ext cx="1396408" cy="369332"/>
-          </a:xfrm>
-          <a:prstGeom prst="rect">
-            <a:avLst/>
-          </a:prstGeom>
-          <a:noFill/>
-        </p:spPr>
-        <p:txBody>
-          <a:bodyPr wrap="none" rtlCol="0">
-            <a:spAutoFit/>
-          </a:bodyPr>
-          <a:lstStyle/>
-          <a:p>
-            <a:r>
-              <a:rPr lang="en-US" sz="1600" dirty="0"/>
-              <a:t>Original</a:t>
-            </a:r>
-            <a:r>
-              <a:rPr lang="en-US" dirty="0"/>
-              <a:t> </a:t>
-            </a:r>
-            <a:r>
-              <a:rPr lang="en-US" sz="1600" dirty="0"/>
-              <a:t>Image</a:t>
-            </a:r>
-          </a:p>
-        </p:txBody>
-      </p:sp>
-      <p:sp>
-        <p:nvSpPr>
-          <p:cNvPr id="37" name="TextBox 36">
-            <a:extLst>
-              <a:ext uri="{FF2B5EF4-FFF2-40B4-BE49-F238E27FC236}">
-                <a16:creationId xmlns:a16="http://schemas.microsoft.com/office/drawing/2014/main" id="{07F62BCF-56C3-4759-B9E0-F707CC398D14}"/>
-              </a:ext>
-            </a:extLst>
-          </p:cNvPr>
-          <p:cNvSpPr txBox="1"/>
-          <p:nvPr/>
-        </p:nvSpPr>
-        <p:spPr>
-          <a:xfrm>
-            <a:off x="4214885" y="290741"/>
-            <a:ext cx="1663019" cy="369332"/>
-          </a:xfrm>
-          <a:prstGeom prst="rect">
-            <a:avLst/>
-          </a:prstGeom>
-          <a:noFill/>
-        </p:spPr>
-        <p:txBody>
-          <a:bodyPr wrap="none" rtlCol="0">
-            <a:spAutoFit/>
-          </a:bodyPr>
-          <a:lstStyle/>
-          <a:p>
-            <a:r>
-              <a:rPr lang="en-US" sz="1600" dirty="0"/>
-              <a:t>Zhu</a:t>
-            </a:r>
-            <a:r>
-              <a:rPr lang="en-US" dirty="0"/>
-              <a:t> et al.(2020)</a:t>
-            </a:r>
-          </a:p>
-        </p:txBody>
-      </p:sp>
-      <p:sp>
-        <p:nvSpPr>
-          <p:cNvPr id="38" name="TextBox 37">
-            <a:extLst>
-              <a:ext uri="{FF2B5EF4-FFF2-40B4-BE49-F238E27FC236}">
-                <a16:creationId xmlns:a16="http://schemas.microsoft.com/office/drawing/2014/main" id="{DE5A20C4-CF74-4C37-9708-1A8BB6399B49}"/>
-              </a:ext>
-            </a:extLst>
-          </p:cNvPr>
-          <p:cNvSpPr txBox="1"/>
-          <p:nvPr/>
-        </p:nvSpPr>
-        <p:spPr>
-          <a:xfrm>
-            <a:off x="7492924" y="92156"/>
-            <a:ext cx="1304460" cy="584775"/>
-          </a:xfrm>
-          <a:prstGeom prst="rect">
-            <a:avLst/>
-          </a:prstGeom>
-          <a:noFill/>
-        </p:spPr>
-        <p:txBody>
-          <a:bodyPr wrap="none" rtlCol="0">
-            <a:spAutoFit/>
-          </a:bodyPr>
-          <a:lstStyle/>
-          <a:p>
-            <a:r>
-              <a:rPr lang="en-US" sz="1600" dirty="0"/>
-              <a:t>Discriminator</a:t>
-            </a:r>
-          </a:p>
-          <a:p>
-            <a:pPr algn="ctr"/>
-            <a:r>
-              <a:rPr lang="en-US" sz="1600" dirty="0"/>
-              <a:t>Ensemble</a:t>
-            </a:r>
-          </a:p>
-        </p:txBody>
-      </p:sp>
-      <p:sp>
-        <p:nvSpPr>
-          <p:cNvPr id="39" name="TextBox 38">
-            <a:extLst>
-              <a:ext uri="{FF2B5EF4-FFF2-40B4-BE49-F238E27FC236}">
-                <a16:creationId xmlns:a16="http://schemas.microsoft.com/office/drawing/2014/main" id="{5860EB0D-4EF7-4939-84AD-4346534E980E}"/>
-              </a:ext>
-            </a:extLst>
-          </p:cNvPr>
-          <p:cNvSpPr txBox="1"/>
-          <p:nvPr/>
-        </p:nvSpPr>
-        <p:spPr>
-          <a:xfrm>
-            <a:off x="5638410" y="29002"/>
-            <a:ext cx="1820435" cy="584775"/>
-          </a:xfrm>
-          <a:prstGeom prst="rect">
-            <a:avLst/>
-          </a:prstGeom>
-          <a:noFill/>
-        </p:spPr>
-        <p:txBody>
-          <a:bodyPr wrap="none" rtlCol="0">
-            <a:spAutoFit/>
-          </a:bodyPr>
-          <a:lstStyle/>
-          <a:p>
-            <a:r>
-              <a:rPr lang="en-US" sz="1600" dirty="0"/>
-              <a:t>With Regularization</a:t>
-            </a:r>
-          </a:p>
-          <a:p>
-            <a:pPr algn="ctr"/>
-            <a:r>
-              <a:rPr lang="en-US" sz="1600" dirty="0"/>
-              <a:t> Schedule</a:t>
-            </a:r>
-          </a:p>
-        </p:txBody>
-      </p:sp>
-      <p:pic>
-        <p:nvPicPr>
-          <p:cNvPr id="25" name="Picture 24">
-            <a:extLst>
-              <a:ext uri="{FF2B5EF4-FFF2-40B4-BE49-F238E27FC236}">
-                <a16:creationId xmlns:a16="http://schemas.microsoft.com/office/drawing/2014/main" id="{038C465B-2ECC-4122-9F38-930BD2233B64}"/>
-              </a:ext>
-            </a:extLst>
-          </p:cNvPr>
-          <p:cNvPicPr>
-            <a:picLocks noChangeAspect="1"/>
-          </p:cNvPicPr>
-          <p:nvPr/>
-        </p:nvPicPr>
-        <p:blipFill>
-          <a:blip r:embed="rId16"/>
-          <a:stretch>
-            <a:fillRect/>
-          </a:stretch>
-        </p:blipFill>
-        <p:spPr>
-          <a:xfrm>
-            <a:off x="5783810" y="3739527"/>
-            <a:ext cx="1609560" cy="1554480"/>
-          </a:xfrm>
-          <a:prstGeom prst="rect">
-            <a:avLst/>
-          </a:prstGeom>
-        </p:spPr>
-      </p:pic>
-      <p:pic>
-        <p:nvPicPr>
-          <p:cNvPr id="35" name="Picture 34">
-            <a:extLst>
-              <a:ext uri="{FF2B5EF4-FFF2-40B4-BE49-F238E27FC236}">
-                <a16:creationId xmlns:a16="http://schemas.microsoft.com/office/drawing/2014/main" id="{D660A9C8-8CCE-490E-8026-941C44600050}"/>
-              </a:ext>
-            </a:extLst>
-          </p:cNvPr>
-          <p:cNvPicPr>
-            <a:picLocks noChangeAspect="1"/>
-          </p:cNvPicPr>
-          <p:nvPr/>
-        </p:nvPicPr>
-        <p:blipFill>
-          <a:blip r:embed="rId17"/>
-          <a:stretch>
-            <a:fillRect/>
-          </a:stretch>
-        </p:blipFill>
-        <p:spPr>
-          <a:xfrm>
-            <a:off x="7318898" y="3756194"/>
-            <a:ext cx="1572556" cy="1554480"/>
-          </a:xfrm>
-          <a:prstGeom prst="rect">
-            <a:avLst/>
-          </a:prstGeom>
+            <a:off x="685800" y="1821358"/>
+            <a:ext cx="10131425" cy="4427042"/>
+          </a:xfrm>
         </p:spPr>
       </p:pic>
     </p:spTree>
     <p:extLst>
       <p:ext uri="{BB962C8B-B14F-4D97-AF65-F5344CB8AC3E}">
-        <p14:creationId xmlns:p14="http://schemas.microsoft.com/office/powerpoint/2010/main" val="256872782"/>
+        <p14:creationId xmlns:p14="http://schemas.microsoft.com/office/powerpoint/2010/main" val="3934748566"/>
       </p:ext>
     </p:extLst>
   </p:cSld>

</xml_diff>

<commit_message>
added CNN and res-net gen on powerpoint
</commit_message>
<xml_diff>
--- a/CycleGAN_simple/report_resources/COMP473_Project.pptx
+++ b/CycleGAN_simple/report_resources/COMP473_Project.pptx
@@ -14,8 +14,11 @@
     <p:sldId id="259" r:id="rId8"/>
     <p:sldId id="262" r:id="rId9"/>
     <p:sldId id="260" r:id="rId10"/>
-    <p:sldId id="261" r:id="rId11"/>
-    <p:sldId id="263" r:id="rId12"/>
+    <p:sldId id="267" r:id="rId11"/>
+    <p:sldId id="268" r:id="rId12"/>
+    <p:sldId id="269" r:id="rId13"/>
+    <p:sldId id="261" r:id="rId14"/>
+    <p:sldId id="263" r:id="rId15"/>
   </p:sldIdLst>
   <p:sldSz cx="12192000" cy="6858000"/>
   <p:notesSz cx="6858000" cy="9144000"/>
@@ -5863,6 +5866,534 @@
 <file path=ppt/slides/slide10.xml><?xml version="1.0" encoding="utf-8"?>
 <p:sld xmlns:a="http://schemas.openxmlformats.org/drawingml/2006/main" xmlns:r="http://schemas.openxmlformats.org/officeDocument/2006/relationships" xmlns:p="http://schemas.openxmlformats.org/presentationml/2006/main">
   <p:cSld>
+    <p:bg>
+      <p:bgPr>
+        <a:blipFill>
+          <a:blip r:embed="rId2"/>
+          <a:stretch/>
+        </a:blipFill>
+        <a:effectLst/>
+      </p:bgPr>
+    </p:bg>
+    <p:spTree>
+      <p:nvGrpSpPr>
+        <p:cNvPr id="1" name=""/>
+        <p:cNvGrpSpPr/>
+        <p:nvPr/>
+      </p:nvGrpSpPr>
+      <p:grpSpPr>
+        <a:xfrm>
+          <a:off x="0" y="0"/>
+          <a:ext cx="0" cy="0"/>
+          <a:chOff x="0" y="0"/>
+          <a:chExt cx="0" cy="0"/>
+        </a:xfrm>
+      </p:grpSpPr>
+      <p:sp>
+        <p:nvSpPr>
+          <p:cNvPr id="2" name="Title 1">
+            <a:extLst>
+              <a:ext uri="{FF2B5EF4-FFF2-40B4-BE49-F238E27FC236}">
+                <a16:creationId xmlns:a16="http://schemas.microsoft.com/office/drawing/2014/main" id="{8BBA0FEE-E819-479C-88C9-CB736E1F5F6C}"/>
+              </a:ext>
+            </a:extLst>
+          </p:cNvPr>
+          <p:cNvSpPr>
+            <a:spLocks noGrp="1"/>
+          </p:cNvSpPr>
+          <p:nvPr>
+            <p:ph type="title"/>
+          </p:nvPr>
+        </p:nvSpPr>
+        <p:spPr>
+          <a:xfrm>
+            <a:off x="7865806" y="643463"/>
+            <a:ext cx="3706762" cy="1608124"/>
+          </a:xfrm>
+        </p:spPr>
+        <p:txBody>
+          <a:bodyPr>
+            <a:normAutofit/>
+          </a:bodyPr>
+          <a:lstStyle/>
+          <a:p>
+            <a:r>
+              <a:rPr lang="en-CA" dirty="0"/>
+              <a:t>Convolutional NEURAL NETWORK</a:t>
+            </a:r>
+          </a:p>
+        </p:txBody>
+      </p:sp>
+      <p:pic>
+        <p:nvPicPr>
+          <p:cNvPr id="5" name="Picture 4">
+            <a:extLst>
+              <a:ext uri="{FF2B5EF4-FFF2-40B4-BE49-F238E27FC236}">
+                <a16:creationId xmlns:a16="http://schemas.microsoft.com/office/drawing/2014/main" id="{311B076F-84EA-4FA8-9F55-96CC9A4E81AA}"/>
+              </a:ext>
+            </a:extLst>
+          </p:cNvPr>
+          <p:cNvPicPr>
+            <a:picLocks noChangeAspect="1"/>
+          </p:cNvPicPr>
+          <p:nvPr/>
+        </p:nvPicPr>
+        <p:blipFill>
+          <a:blip r:embed="rId3"/>
+          <a:stretch>
+            <a:fillRect/>
+          </a:stretch>
+        </p:blipFill>
+        <p:spPr>
+          <a:xfrm>
+            <a:off x="0" y="1387439"/>
+            <a:ext cx="7752446" cy="3876223"/>
+          </a:xfrm>
+          <a:prstGeom prst="roundRect">
+            <a:avLst>
+              <a:gd name="adj" fmla="val 4380"/>
+            </a:avLst>
+          </a:prstGeom>
+          <a:ln w="50800" cap="sq" cmpd="dbl">
+            <a:gradFill flip="none" rotWithShape="1">
+              <a:gsLst>
+                <a:gs pos="0">
+                  <a:srgbClr val="FFFFFF"/>
+                </a:gs>
+                <a:gs pos="100000">
+                  <a:schemeClr val="tx1">
+                    <a:alpha val="0"/>
+                  </a:schemeClr>
+                </a:gs>
+              </a:gsLst>
+              <a:path path="circle">
+                <a:fillToRect l="50000" t="50000" r="50000" b="50000"/>
+              </a:path>
+              <a:tileRect/>
+            </a:gradFill>
+            <a:miter lim="800000"/>
+          </a:ln>
+          <a:effectLst>
+            <a:outerShdw blurRad="254000" algn="tl" rotWithShape="0">
+              <a:srgbClr val="000000">
+                <a:alpha val="43000"/>
+              </a:srgbClr>
+            </a:outerShdw>
+          </a:effectLst>
+        </p:spPr>
+      </p:pic>
+      <p:sp>
+        <p:nvSpPr>
+          <p:cNvPr id="3" name="Content Placeholder 2">
+            <a:extLst>
+              <a:ext uri="{FF2B5EF4-FFF2-40B4-BE49-F238E27FC236}">
+                <a16:creationId xmlns:a16="http://schemas.microsoft.com/office/drawing/2014/main" id="{B235DF1C-A092-47F8-B36E-4A935926742F}"/>
+              </a:ext>
+            </a:extLst>
+          </p:cNvPr>
+          <p:cNvSpPr>
+            <a:spLocks noGrp="1"/>
+          </p:cNvSpPr>
+          <p:nvPr>
+            <p:ph idx="1"/>
+          </p:nvPr>
+        </p:nvSpPr>
+        <p:spPr>
+          <a:xfrm>
+            <a:off x="7865806" y="2251587"/>
+            <a:ext cx="3706762" cy="3972232"/>
+          </a:xfrm>
+        </p:spPr>
+        <p:txBody>
+          <a:bodyPr>
+            <a:normAutofit/>
+          </a:bodyPr>
+          <a:lstStyle/>
+          <a:p>
+            <a:r>
+              <a:rPr lang="en-CA" dirty="0"/>
+              <a:t># of inputs, weight sum, activation function, output</a:t>
+            </a:r>
+          </a:p>
+          <a:p>
+            <a:r>
+              <a:rPr lang="en-CA" dirty="0"/>
+              <a:t>Image classified as label</a:t>
+            </a:r>
+          </a:p>
+          <a:p>
+            <a:endParaRPr lang="en-CA" dirty="0"/>
+          </a:p>
+        </p:txBody>
+      </p:sp>
+    </p:spTree>
+    <p:extLst>
+      <p:ext uri="{BB962C8B-B14F-4D97-AF65-F5344CB8AC3E}">
+        <p14:creationId xmlns:p14="http://schemas.microsoft.com/office/powerpoint/2010/main" val="2901260728"/>
+      </p:ext>
+    </p:extLst>
+  </p:cSld>
+  <p:clrMapOvr>
+    <a:masterClrMapping/>
+  </p:clrMapOvr>
+</p:sld>
+</file>
+
+<file path=ppt/slides/slide11.xml><?xml version="1.0" encoding="utf-8"?>
+<p:sld xmlns:a="http://schemas.openxmlformats.org/drawingml/2006/main" xmlns:r="http://schemas.openxmlformats.org/officeDocument/2006/relationships" xmlns:p="http://schemas.openxmlformats.org/presentationml/2006/main">
+  <p:cSld>
+    <p:spTree>
+      <p:nvGrpSpPr>
+        <p:cNvPr id="1" name=""/>
+        <p:cNvGrpSpPr/>
+        <p:nvPr/>
+      </p:nvGrpSpPr>
+      <p:grpSpPr>
+        <a:xfrm>
+          <a:off x="0" y="0"/>
+          <a:ext cx="0" cy="0"/>
+          <a:chOff x="0" y="0"/>
+          <a:chExt cx="0" cy="0"/>
+        </a:xfrm>
+      </p:grpSpPr>
+      <p:sp>
+        <p:nvSpPr>
+          <p:cNvPr id="2" name="Title 1">
+            <a:extLst>
+              <a:ext uri="{FF2B5EF4-FFF2-40B4-BE49-F238E27FC236}">
+                <a16:creationId xmlns:a16="http://schemas.microsoft.com/office/drawing/2014/main" id="{6993D4C6-5F63-4112-A080-CC1C51C48B8F}"/>
+              </a:ext>
+            </a:extLst>
+          </p:cNvPr>
+          <p:cNvSpPr>
+            <a:spLocks noGrp="1"/>
+          </p:cNvSpPr>
+          <p:nvPr>
+            <p:ph type="title"/>
+          </p:nvPr>
+        </p:nvSpPr>
+        <p:spPr>
+          <a:xfrm>
+            <a:off x="685801" y="609599"/>
+            <a:ext cx="10131425" cy="1456267"/>
+          </a:xfrm>
+        </p:spPr>
+        <p:txBody>
+          <a:bodyPr/>
+          <a:lstStyle/>
+          <a:p>
+            <a:r>
+              <a:rPr lang="en-CA" dirty="0"/>
+              <a:t>Res-net</a:t>
+            </a:r>
+          </a:p>
+        </p:txBody>
+      </p:sp>
+      <p:sp>
+        <p:nvSpPr>
+          <p:cNvPr id="3" name="Content Placeholder 2">
+            <a:extLst>
+              <a:ext uri="{FF2B5EF4-FFF2-40B4-BE49-F238E27FC236}">
+                <a16:creationId xmlns:a16="http://schemas.microsoft.com/office/drawing/2014/main" id="{6483DDDD-DF85-4FF2-8F07-047DA499C4B1}"/>
+              </a:ext>
+            </a:extLst>
+          </p:cNvPr>
+          <p:cNvSpPr>
+            <a:spLocks noGrp="1"/>
+          </p:cNvSpPr>
+          <p:nvPr>
+            <p:ph idx="1"/>
+          </p:nvPr>
+        </p:nvSpPr>
+        <p:spPr>
+          <a:xfrm>
+            <a:off x="6518032" y="987345"/>
+            <a:ext cx="5281245" cy="2693702"/>
+          </a:xfrm>
+        </p:spPr>
+        <p:txBody>
+          <a:bodyPr/>
+          <a:lstStyle/>
+          <a:p>
+            <a:r>
+              <a:rPr lang="en-CA" dirty="0"/>
+              <a:t>Residual blocks w/ skip connections</a:t>
+            </a:r>
+          </a:p>
+          <a:p>
+            <a:r>
+              <a:rPr lang="en-CA" dirty="0"/>
+              <a:t>Vanishing gradient problem: limit in # of layers added in accuracy improvement</a:t>
+            </a:r>
+          </a:p>
+          <a:p>
+            <a:r>
+              <a:rPr lang="en-CA" dirty="0"/>
+              <a:t>Activation is fast-forwarded</a:t>
+            </a:r>
+          </a:p>
+        </p:txBody>
+      </p:sp>
+      <p:pic>
+        <p:nvPicPr>
+          <p:cNvPr id="1026" name="Picture 2">
+            <a:extLst>
+              <a:ext uri="{FF2B5EF4-FFF2-40B4-BE49-F238E27FC236}">
+                <a16:creationId xmlns:a16="http://schemas.microsoft.com/office/drawing/2014/main" id="{88E174AE-72D1-4FA2-873C-F38787162899}"/>
+              </a:ext>
+            </a:extLst>
+          </p:cNvPr>
+          <p:cNvPicPr>
+            <a:picLocks noChangeAspect="1" noChangeArrowheads="1"/>
+          </p:cNvPicPr>
+          <p:nvPr/>
+        </p:nvPicPr>
+        <p:blipFill>
+          <a:blip r:embed="rId2">
+            <a:extLst>
+              <a:ext uri="{28A0092B-C50C-407E-A947-70E740481C1C}">
+                <a14:useLocalDpi xmlns:a14="http://schemas.microsoft.com/office/drawing/2010/main" val="0"/>
+              </a:ext>
+            </a:extLst>
+          </a:blip>
+          <a:srcRect/>
+          <a:stretch>
+            <a:fillRect/>
+          </a:stretch>
+        </p:blipFill>
+        <p:spPr bwMode="auto">
+          <a:xfrm>
+            <a:off x="152400" y="1901743"/>
+            <a:ext cx="5943600" cy="4124325"/>
+          </a:xfrm>
+          <a:prstGeom prst="rect">
+            <a:avLst/>
+          </a:prstGeom>
+          <a:noFill/>
+          <a:extLst>
+            <a:ext uri="{909E8E84-426E-40DD-AFC4-6F175D3DCCD1}">
+              <a14:hiddenFill xmlns:a14="http://schemas.microsoft.com/office/drawing/2010/main">
+                <a:solidFill>
+                  <a:srgbClr val="FFFFFF"/>
+                </a:solidFill>
+              </a14:hiddenFill>
+            </a:ext>
+          </a:extLst>
+        </p:spPr>
+      </p:pic>
+      <p:pic>
+        <p:nvPicPr>
+          <p:cNvPr id="4" name="Picture 3">
+            <a:extLst>
+              <a:ext uri="{FF2B5EF4-FFF2-40B4-BE49-F238E27FC236}">
+                <a16:creationId xmlns:a16="http://schemas.microsoft.com/office/drawing/2014/main" id="{3C086F11-4199-403F-9EC5-FECEE02D171F}"/>
+              </a:ext>
+            </a:extLst>
+          </p:cNvPr>
+          <p:cNvPicPr>
+            <a:picLocks noChangeAspect="1"/>
+          </p:cNvPicPr>
+          <p:nvPr/>
+        </p:nvPicPr>
+        <p:blipFill>
+          <a:blip r:embed="rId3"/>
+          <a:stretch>
+            <a:fillRect/>
+          </a:stretch>
+        </p:blipFill>
+        <p:spPr>
+          <a:xfrm>
+            <a:off x="6283567" y="3060534"/>
+            <a:ext cx="5375031" cy="2965534"/>
+          </a:xfrm>
+          <a:prstGeom prst="rect">
+            <a:avLst/>
+          </a:prstGeom>
+        </p:spPr>
+      </p:pic>
+    </p:spTree>
+    <p:extLst>
+      <p:ext uri="{BB962C8B-B14F-4D97-AF65-F5344CB8AC3E}">
+        <p14:creationId xmlns:p14="http://schemas.microsoft.com/office/powerpoint/2010/main" val="1812269252"/>
+      </p:ext>
+    </p:extLst>
+  </p:cSld>
+  <p:clrMapOvr>
+    <a:masterClrMapping/>
+  </p:clrMapOvr>
+</p:sld>
+</file>
+
+<file path=ppt/slides/slide12.xml><?xml version="1.0" encoding="utf-8"?>
+<p:sld xmlns:a="http://schemas.openxmlformats.org/drawingml/2006/main" xmlns:r="http://schemas.openxmlformats.org/officeDocument/2006/relationships" xmlns:p="http://schemas.openxmlformats.org/presentationml/2006/main">
+  <p:cSld>
+    <p:bg>
+      <p:bgPr>
+        <a:blipFill>
+          <a:blip r:embed="rId2"/>
+          <a:stretch/>
+        </a:blipFill>
+        <a:effectLst/>
+      </p:bgPr>
+    </p:bg>
+    <p:spTree>
+      <p:nvGrpSpPr>
+        <p:cNvPr id="1" name=""/>
+        <p:cNvGrpSpPr/>
+        <p:nvPr/>
+      </p:nvGrpSpPr>
+      <p:grpSpPr>
+        <a:xfrm>
+          <a:off x="0" y="0"/>
+          <a:ext cx="0" cy="0"/>
+          <a:chOff x="0" y="0"/>
+          <a:chExt cx="0" cy="0"/>
+        </a:xfrm>
+      </p:grpSpPr>
+      <p:sp>
+        <p:nvSpPr>
+          <p:cNvPr id="2" name="Title 1">
+            <a:extLst>
+              <a:ext uri="{FF2B5EF4-FFF2-40B4-BE49-F238E27FC236}">
+                <a16:creationId xmlns:a16="http://schemas.microsoft.com/office/drawing/2014/main" id="{27A133E6-62A2-4D8A-A909-34A562B38E7A}"/>
+              </a:ext>
+            </a:extLst>
+          </p:cNvPr>
+          <p:cNvSpPr>
+            <a:spLocks noGrp="1"/>
+          </p:cNvSpPr>
+          <p:nvPr>
+            <p:ph type="title"/>
+          </p:nvPr>
+        </p:nvSpPr>
+        <p:spPr>
+          <a:xfrm>
+            <a:off x="7865806" y="162817"/>
+            <a:ext cx="3706762" cy="1608124"/>
+          </a:xfrm>
+        </p:spPr>
+        <p:txBody>
+          <a:bodyPr>
+            <a:normAutofit/>
+          </a:bodyPr>
+          <a:lstStyle/>
+          <a:p>
+            <a:r>
+              <a:rPr lang="en-CA" dirty="0"/>
+              <a:t>RES-NET</a:t>
+            </a:r>
+          </a:p>
+        </p:txBody>
+      </p:sp>
+      <p:pic>
+        <p:nvPicPr>
+          <p:cNvPr id="4" name="Picture 3">
+            <a:extLst>
+              <a:ext uri="{FF2B5EF4-FFF2-40B4-BE49-F238E27FC236}">
+                <a16:creationId xmlns:a16="http://schemas.microsoft.com/office/drawing/2014/main" id="{BB3BA9B5-07FF-4BE6-AE82-7D27E8C36CC7}"/>
+              </a:ext>
+            </a:extLst>
+          </p:cNvPr>
+          <p:cNvPicPr>
+            <a:picLocks noChangeAspect="1"/>
+          </p:cNvPicPr>
+          <p:nvPr/>
+        </p:nvPicPr>
+        <p:blipFill>
+          <a:blip r:embed="rId3"/>
+          <a:stretch>
+            <a:fillRect/>
+          </a:stretch>
+        </p:blipFill>
+        <p:spPr>
+          <a:xfrm>
+            <a:off x="29522" y="1465385"/>
+            <a:ext cx="7694484" cy="3481753"/>
+          </a:xfrm>
+          <a:prstGeom prst="roundRect">
+            <a:avLst>
+              <a:gd name="adj" fmla="val 4380"/>
+            </a:avLst>
+          </a:prstGeom>
+          <a:ln w="50800" cap="sq" cmpd="dbl">
+            <a:gradFill flip="none" rotWithShape="1">
+              <a:gsLst>
+                <a:gs pos="0">
+                  <a:srgbClr val="FFFFFF"/>
+                </a:gs>
+                <a:gs pos="100000">
+                  <a:schemeClr val="tx1">
+                    <a:alpha val="0"/>
+                  </a:schemeClr>
+                </a:gs>
+              </a:gsLst>
+              <a:path path="circle">
+                <a:fillToRect l="50000" t="50000" r="50000" b="50000"/>
+              </a:path>
+              <a:tileRect/>
+            </a:gradFill>
+            <a:miter lim="800000"/>
+          </a:ln>
+          <a:effectLst>
+            <a:outerShdw blurRad="254000" algn="tl" rotWithShape="0">
+              <a:srgbClr val="000000">
+                <a:alpha val="43000"/>
+              </a:srgbClr>
+            </a:outerShdw>
+          </a:effectLst>
+        </p:spPr>
+      </p:pic>
+      <p:sp>
+        <p:nvSpPr>
+          <p:cNvPr id="3" name="Content Placeholder 2">
+            <a:extLst>
+              <a:ext uri="{FF2B5EF4-FFF2-40B4-BE49-F238E27FC236}">
+                <a16:creationId xmlns:a16="http://schemas.microsoft.com/office/drawing/2014/main" id="{A134376C-0B0C-4AEF-98D1-FB254D2CBF3B}"/>
+              </a:ext>
+            </a:extLst>
+          </p:cNvPr>
+          <p:cNvSpPr>
+            <a:spLocks noGrp="1"/>
+          </p:cNvSpPr>
+          <p:nvPr>
+            <p:ph idx="1"/>
+          </p:nvPr>
+        </p:nvSpPr>
+        <p:spPr>
+          <a:xfrm>
+            <a:off x="7865806" y="1630264"/>
+            <a:ext cx="3706762" cy="3972232"/>
+          </a:xfrm>
+        </p:spPr>
+        <p:txBody>
+          <a:bodyPr>
+            <a:normAutofit/>
+          </a:bodyPr>
+          <a:lstStyle/>
+          <a:p>
+            <a:r>
+              <a:rPr lang="en-CA" dirty="0"/>
+              <a:t>Smoothness of loss function: easier to train model with optimal weights</a:t>
+            </a:r>
+          </a:p>
+        </p:txBody>
+      </p:sp>
+    </p:spTree>
+    <p:extLst>
+      <p:ext uri="{BB962C8B-B14F-4D97-AF65-F5344CB8AC3E}">
+        <p14:creationId xmlns:p14="http://schemas.microsoft.com/office/powerpoint/2010/main" val="745972732"/>
+      </p:ext>
+    </p:extLst>
+  </p:cSld>
+  <p:clrMapOvr>
+    <a:masterClrMapping/>
+  </p:clrMapOvr>
+</p:sld>
+</file>
+
+<file path=ppt/slides/slide13.xml><?xml version="1.0" encoding="utf-8"?>
+<p:sld xmlns:a="http://schemas.openxmlformats.org/drawingml/2006/main" xmlns:r="http://schemas.openxmlformats.org/officeDocument/2006/relationships" xmlns:p="http://schemas.openxmlformats.org/presentationml/2006/main">
+  <p:cSld>
     <p:spTree>
       <p:nvGrpSpPr>
         <p:cNvPr id="1" name=""/>
@@ -6175,7 +6706,7 @@
 </p:sld>
 </file>
 
-<file path=ppt/slides/slide11.xml><?xml version="1.0" encoding="utf-8"?>
+<file path=ppt/slides/slide14.xml><?xml version="1.0" encoding="utf-8"?>
 <p:sld xmlns:a="http://schemas.openxmlformats.org/drawingml/2006/main" xmlns:r="http://schemas.openxmlformats.org/officeDocument/2006/relationships" xmlns:p="http://schemas.openxmlformats.org/presentationml/2006/main">
   <p:cSld>
     <p:spTree>

</xml_diff>